<commit_message>
Some progress on the presentation
</commit_message>
<xml_diff>
--- a/presentation/Intermediate Presentation.pptx
+++ b/presentation/Intermediate Presentation.pptx
@@ -5,7 +5,7 @@
     <p:sldMasterId id="2147483648" r:id="rId1"/>
   </p:sldMasterIdLst>
   <p:notesMasterIdLst>
-    <p:notesMasterId r:id="rId22"/>
+    <p:notesMasterId r:id="rId24"/>
   </p:notesMasterIdLst>
   <p:sldIdLst>
     <p:sldId id="256" r:id="rId2"/>
@@ -20,14 +20,16 @@
     <p:sldId id="270" r:id="rId11"/>
     <p:sldId id="265" r:id="rId12"/>
     <p:sldId id="275" r:id="rId13"/>
-    <p:sldId id="273" r:id="rId14"/>
-    <p:sldId id="266" r:id="rId15"/>
-    <p:sldId id="268" r:id="rId16"/>
-    <p:sldId id="269" r:id="rId17"/>
-    <p:sldId id="271" r:id="rId18"/>
-    <p:sldId id="267" r:id="rId19"/>
-    <p:sldId id="272" r:id="rId20"/>
-    <p:sldId id="274" r:id="rId21"/>
+    <p:sldId id="276" r:id="rId14"/>
+    <p:sldId id="273" r:id="rId15"/>
+    <p:sldId id="266" r:id="rId16"/>
+    <p:sldId id="268" r:id="rId17"/>
+    <p:sldId id="269" r:id="rId18"/>
+    <p:sldId id="271" r:id="rId19"/>
+    <p:sldId id="277" r:id="rId20"/>
+    <p:sldId id="267" r:id="rId21"/>
+    <p:sldId id="272" r:id="rId22"/>
+    <p:sldId id="274" r:id="rId23"/>
   </p:sldIdLst>
   <p:sldSz cx="12192000" cy="6858000"/>
   <p:notesSz cx="6858000" cy="9144000"/>
@@ -216,7 +218,7 @@
           <a:p>
             <a:fld id="{01963D08-B959-4AB6-95BF-A28840883159}" type="datetimeFigureOut">
               <a:rPr lang="nl-BE" smtClean="0"/>
-              <a:t>14/03/2016</a:t>
+              <a:t>15/03/2016</a:t>
             </a:fld>
             <a:endParaRPr lang="nl-BE"/>
           </a:p>
@@ -642,7 +644,7 @@
     </p:spTree>
     <p:extLst>
       <p:ext uri="{BB962C8B-B14F-4D97-AF65-F5344CB8AC3E}">
-        <p14:creationId xmlns:p14="http://schemas.microsoft.com/office/powerpoint/2010/main" val="3104928219"/>
+        <p14:creationId xmlns:p14="http://schemas.microsoft.com/office/powerpoint/2010/main" val="3187012082"/>
       </p:ext>
     </p:extLst>
   </p:cSld>
@@ -717,7 +719,91 @@
           <a:p>
             <a:fld id="{3393AA9F-D72C-463D-9782-972043CF7B88}" type="slidenum">
               <a:rPr lang="nl-BE" smtClean="0"/>
-              <a:t>20</a:t>
+              <a:t>21</a:t>
+            </a:fld>
+            <a:endParaRPr lang="nl-BE"/>
+          </a:p>
+        </p:txBody>
+      </p:sp>
+    </p:spTree>
+    <p:extLst>
+      <p:ext uri="{BB962C8B-B14F-4D97-AF65-F5344CB8AC3E}">
+        <p14:creationId xmlns:p14="http://schemas.microsoft.com/office/powerpoint/2010/main" val="3104928219"/>
+      </p:ext>
+    </p:extLst>
+  </p:cSld>
+  <p:clrMapOvr>
+    <a:masterClrMapping/>
+  </p:clrMapOvr>
+</p:notes>
+</file>
+
+<file path=ppt/notesSlides/notesSlide4.xml><?xml version="1.0" encoding="utf-8"?>
+<p:notes xmlns:a="http://schemas.openxmlformats.org/drawingml/2006/main" xmlns:r="http://schemas.openxmlformats.org/officeDocument/2006/relationships" xmlns:p="http://schemas.openxmlformats.org/presentationml/2006/main">
+  <p:cSld>
+    <p:spTree>
+      <p:nvGrpSpPr>
+        <p:cNvPr id="1" name=""/>
+        <p:cNvGrpSpPr/>
+        <p:nvPr/>
+      </p:nvGrpSpPr>
+      <p:grpSpPr>
+        <a:xfrm>
+          <a:off x="0" y="0"/>
+          <a:ext cx="0" cy="0"/>
+          <a:chOff x="0" y="0"/>
+          <a:chExt cx="0" cy="0"/>
+        </a:xfrm>
+      </p:grpSpPr>
+      <p:sp>
+        <p:nvSpPr>
+          <p:cNvPr id="2" name="Slide Image Placeholder 1"/>
+          <p:cNvSpPr>
+            <a:spLocks noGrp="1" noRot="1" noChangeAspect="1"/>
+          </p:cNvSpPr>
+          <p:nvPr>
+            <p:ph type="sldImg"/>
+          </p:nvPr>
+        </p:nvSpPr>
+        <p:spPr/>
+      </p:sp>
+      <p:sp>
+        <p:nvSpPr>
+          <p:cNvPr id="3" name="Notes Placeholder 2"/>
+          <p:cNvSpPr>
+            <a:spLocks noGrp="1"/>
+          </p:cNvSpPr>
+          <p:nvPr>
+            <p:ph type="body" idx="1"/>
+          </p:nvPr>
+        </p:nvSpPr>
+        <p:spPr/>
+        <p:txBody>
+          <a:bodyPr/>
+          <a:lstStyle/>
+          <a:p>
+            <a:endParaRPr lang="nl-BE"/>
+          </a:p>
+        </p:txBody>
+      </p:sp>
+      <p:sp>
+        <p:nvSpPr>
+          <p:cNvPr id="4" name="Slide Number Placeholder 3"/>
+          <p:cNvSpPr>
+            <a:spLocks noGrp="1"/>
+          </p:cNvSpPr>
+          <p:nvPr>
+            <p:ph type="sldNum" sz="quarter" idx="10"/>
+          </p:nvPr>
+        </p:nvSpPr>
+        <p:spPr/>
+        <p:txBody>
+          <a:bodyPr/>
+          <a:lstStyle/>
+          <a:p>
+            <a:fld id="{3393AA9F-D72C-463D-9782-972043CF7B88}" type="slidenum">
+              <a:rPr lang="nl-BE" smtClean="0"/>
+              <a:t>22</a:t>
             </a:fld>
             <a:endParaRPr lang="nl-BE"/>
           </a:p>
@@ -867,7 +953,7 @@
           <a:p>
             <a:fld id="{9E72DAE6-35CB-4F75-B445-E63BA6E6BE9D}" type="datetime1">
               <a:rPr lang="nl-BE" smtClean="0"/>
-              <a:t>14/03/2016</a:t>
+              <a:t>15/03/2016</a:t>
             </a:fld>
             <a:endParaRPr lang="nl-BE"/>
           </a:p>
@@ -1041,7 +1127,7 @@
           <a:p>
             <a:fld id="{AB3B8E0A-2F7D-4C42-A4F7-EA05A5027511}" type="datetime1">
               <a:rPr lang="nl-BE" smtClean="0"/>
-              <a:t>14/03/2016</a:t>
+              <a:t>15/03/2016</a:t>
             </a:fld>
             <a:endParaRPr lang="nl-BE"/>
           </a:p>
@@ -1225,7 +1311,7 @@
           <a:p>
             <a:fld id="{2931C40C-86C9-4653-BEC0-4FB034E8A536}" type="datetime1">
               <a:rPr lang="nl-BE" smtClean="0"/>
-              <a:t>14/03/2016</a:t>
+              <a:t>15/03/2016</a:t>
             </a:fld>
             <a:endParaRPr lang="nl-BE"/>
           </a:p>
@@ -1399,7 +1485,7 @@
           <a:p>
             <a:fld id="{1928B6EA-3481-40C9-8B91-73902F4E22C5}" type="datetime1">
               <a:rPr lang="nl-BE" smtClean="0"/>
-              <a:t>14/03/2016</a:t>
+              <a:t>15/03/2016</a:t>
             </a:fld>
             <a:endParaRPr lang="nl-BE"/>
           </a:p>
@@ -1649,7 +1735,7 @@
           <a:p>
             <a:fld id="{A76593C9-74D7-46BC-9A16-90B18C8AEAE6}" type="datetime1">
               <a:rPr lang="nl-BE" smtClean="0"/>
-              <a:t>14/03/2016</a:t>
+              <a:t>15/03/2016</a:t>
             </a:fld>
             <a:endParaRPr lang="nl-BE"/>
           </a:p>
@@ -1885,7 +1971,7 @@
           <a:p>
             <a:fld id="{AF988A33-DBC2-4F3C-8E3E-C5BCA46411FA}" type="datetime1">
               <a:rPr lang="nl-BE" smtClean="0"/>
-              <a:t>14/03/2016</a:t>
+              <a:t>15/03/2016</a:t>
             </a:fld>
             <a:endParaRPr lang="nl-BE"/>
           </a:p>
@@ -2256,7 +2342,7 @@
           <a:p>
             <a:fld id="{101A8F35-61A6-4FCE-98C1-BD56B64042FD}" type="datetime1">
               <a:rPr lang="nl-BE" smtClean="0"/>
-              <a:t>14/03/2016</a:t>
+              <a:t>15/03/2016</a:t>
             </a:fld>
             <a:endParaRPr lang="nl-BE"/>
           </a:p>
@@ -2378,7 +2464,7 @@
           <a:p>
             <a:fld id="{A3AB6747-8571-485F-8138-80A60DD0F67C}" type="datetime1">
               <a:rPr lang="nl-BE" smtClean="0"/>
-              <a:t>14/03/2016</a:t>
+              <a:t>15/03/2016</a:t>
             </a:fld>
             <a:endParaRPr lang="nl-BE"/>
           </a:p>
@@ -2477,7 +2563,7 @@
           <a:p>
             <a:fld id="{9A50E496-7786-4BD6-9882-6AE5A6512998}" type="datetime1">
               <a:rPr lang="nl-BE" smtClean="0"/>
-              <a:t>14/03/2016</a:t>
+              <a:t>15/03/2016</a:t>
             </a:fld>
             <a:endParaRPr lang="nl-BE"/>
           </a:p>
@@ -2758,7 +2844,7 @@
           <a:p>
             <a:fld id="{80C7D598-A32E-4E16-9D25-37512F304E09}" type="datetime1">
               <a:rPr lang="nl-BE" smtClean="0"/>
-              <a:t>14/03/2016</a:t>
+              <a:t>15/03/2016</a:t>
             </a:fld>
             <a:endParaRPr lang="nl-BE"/>
           </a:p>
@@ -3015,7 +3101,7 @@
           <a:p>
             <a:fld id="{F5909C26-1E95-4033-8084-732BC7DA3826}" type="datetime1">
               <a:rPr lang="nl-BE" smtClean="0"/>
-              <a:t>14/03/2016</a:t>
+              <a:t>15/03/2016</a:t>
             </a:fld>
             <a:endParaRPr lang="nl-BE"/>
           </a:p>
@@ -3232,7 +3318,7 @@
           <a:p>
             <a:fld id="{ADED6692-0A52-436D-84AE-22609B4C7703}" type="datetime1">
               <a:rPr lang="nl-BE" smtClean="0"/>
-              <a:t>14/03/2016</a:t>
+              <a:t>15/03/2016</a:t>
             </a:fld>
             <a:endParaRPr lang="nl-BE"/>
           </a:p>
@@ -3792,15 +3878,7 @@
             </a:r>
             <a:r>
               <a:rPr lang="nl-NL" dirty="0" smtClean="0"/>
-              <a:t> o</a:t>
-            </a:r>
-            <a:r>
-              <a:rPr lang="nl-NL" dirty="0" smtClean="0"/>
-              <a:t>utput </a:t>
-            </a:r>
-            <a:r>
-              <a:rPr lang="nl-NL" dirty="0" smtClean="0"/>
-              <a:t>in </a:t>
+              <a:t> output in </a:t>
             </a:r>
             <a:r>
               <a:rPr lang="nl-NL" dirty="0" err="1" smtClean="0"/>
@@ -4375,16 +4453,8 @@
           <a:lstStyle/>
           <a:p>
             <a:r>
-              <a:rPr lang="nl-NL" dirty="0" err="1" smtClean="0"/>
-              <a:t>Nested</a:t>
-            </a:r>
-            <a:r>
-              <a:rPr lang="nl-NL" dirty="0" smtClean="0"/>
-              <a:t> </a:t>
-            </a:r>
-            <a:r>
-              <a:rPr lang="nl-NL" dirty="0" err="1" smtClean="0"/>
-              <a:t>methods</a:t>
+              <a:rPr lang="nl-NL" dirty="0" smtClean="0"/>
+              <a:t>Context types</a:t>
             </a:r>
             <a:endParaRPr lang="nl-BE" dirty="0"/>
           </a:p>
@@ -4405,35 +4475,7 @@
           <a:bodyPr/>
           <a:lstStyle/>
           <a:p>
-            <a:r>
-              <a:rPr lang="nl-NL" dirty="0" err="1" smtClean="0"/>
-              <a:t>Allow</a:t>
-            </a:r>
-            <a:r>
-              <a:rPr lang="nl-NL" dirty="0" smtClean="0"/>
-              <a:t> </a:t>
-            </a:r>
-            <a:r>
-              <a:rPr lang="nl-NL" dirty="0" err="1" smtClean="0"/>
-              <a:t>fo</a:t>
-            </a:r>
-            <a:r>
-              <a:rPr lang="nl-NL" dirty="0" err="1" smtClean="0"/>
-              <a:t>r</a:t>
-            </a:r>
-            <a:r>
-              <a:rPr lang="nl-NL" dirty="0" smtClean="0"/>
-              <a:t> nesting of </a:t>
-            </a:r>
-            <a:r>
-              <a:rPr lang="nl-NL" dirty="0" err="1" smtClean="0"/>
-              <a:t>the</a:t>
-            </a:r>
-            <a:r>
-              <a:rPr lang="nl-NL" dirty="0" smtClean="0"/>
-              <a:t> operator</a:t>
-            </a:r>
-            <a:endParaRPr lang="nl-BE" dirty="0"/>
+            <a:endParaRPr lang="nl-BE"/>
           </a:p>
         </p:txBody>
       </p:sp>
@@ -4489,35 +4531,162 @@
           </a:p>
         </p:txBody>
       </p:sp>
-      <p:pic>
-        <p:nvPicPr>
-          <p:cNvPr id="6" name="Picture 5"/>
-          <p:cNvPicPr>
-            <a:picLocks noChangeAspect="1"/>
-          </p:cNvPicPr>
-          <p:nvPr/>
-        </p:nvPicPr>
-        <p:blipFill rotWithShape="1">
-          <a:blip r:embed="rId2">
-            <a:extLst>
-              <a:ext uri="{28A0092B-C50C-407E-A947-70E740481C1C}">
-                <a14:useLocalDpi xmlns:a14="http://schemas.microsoft.com/office/drawing/2010/main" val="0"/>
-              </a:ext>
-            </a:extLst>
-          </a:blip>
-          <a:srcRect t="75830"/>
-          <a:stretch/>
-        </p:blipFill>
-        <p:spPr>
-          <a:xfrm>
-            <a:off x="6335305" y="1387641"/>
-            <a:ext cx="5102716" cy="1831710"/>
-          </a:xfrm>
-          <a:prstGeom prst="rect">
-            <a:avLst/>
-          </a:prstGeom>
-        </p:spPr>
-      </p:pic>
+    </p:spTree>
+    <p:extLst>
+      <p:ext uri="{BB962C8B-B14F-4D97-AF65-F5344CB8AC3E}">
+        <p14:creationId xmlns:p14="http://schemas.microsoft.com/office/powerpoint/2010/main" val="3431748182"/>
+      </p:ext>
+    </p:extLst>
+  </p:cSld>
+  <p:clrMapOvr>
+    <a:masterClrMapping/>
+  </p:clrMapOvr>
+</p:sld>
+</file>
+
+<file path=ppt/slides/slide14.xml><?xml version="1.0" encoding="utf-8"?>
+<p:sld xmlns:a="http://schemas.openxmlformats.org/drawingml/2006/main" xmlns:r="http://schemas.openxmlformats.org/officeDocument/2006/relationships" xmlns:p="http://schemas.openxmlformats.org/presentationml/2006/main">
+  <p:cSld>
+    <p:spTree>
+      <p:nvGrpSpPr>
+        <p:cNvPr id="1" name=""/>
+        <p:cNvGrpSpPr/>
+        <p:nvPr/>
+      </p:nvGrpSpPr>
+      <p:grpSpPr>
+        <a:xfrm>
+          <a:off x="0" y="0"/>
+          <a:ext cx="0" cy="0"/>
+          <a:chOff x="0" y="0"/>
+          <a:chExt cx="0" cy="0"/>
+        </a:xfrm>
+      </p:grpSpPr>
+      <p:sp>
+        <p:nvSpPr>
+          <p:cNvPr id="2" name="Title 1"/>
+          <p:cNvSpPr>
+            <a:spLocks noGrp="1"/>
+          </p:cNvSpPr>
+          <p:nvPr>
+            <p:ph type="title"/>
+          </p:nvPr>
+        </p:nvSpPr>
+        <p:spPr/>
+        <p:txBody>
+          <a:bodyPr/>
+          <a:lstStyle/>
+          <a:p>
+            <a:r>
+              <a:rPr lang="nl-NL" dirty="0" err="1" smtClean="0"/>
+              <a:t>Nested</a:t>
+            </a:r>
+            <a:r>
+              <a:rPr lang="nl-NL" dirty="0" smtClean="0"/>
+              <a:t> </a:t>
+            </a:r>
+            <a:r>
+              <a:rPr lang="nl-NL" dirty="0" err="1" smtClean="0"/>
+              <a:t>methods</a:t>
+            </a:r>
+            <a:endParaRPr lang="nl-BE" dirty="0"/>
+          </a:p>
+        </p:txBody>
+      </p:sp>
+      <p:sp>
+        <p:nvSpPr>
+          <p:cNvPr id="3" name="Content Placeholder 2"/>
+          <p:cNvSpPr>
+            <a:spLocks noGrp="1"/>
+          </p:cNvSpPr>
+          <p:nvPr>
+            <p:ph idx="1"/>
+          </p:nvPr>
+        </p:nvSpPr>
+        <p:spPr/>
+        <p:txBody>
+          <a:bodyPr/>
+          <a:lstStyle/>
+          <a:p>
+            <a:r>
+              <a:rPr lang="nl-NL" dirty="0" err="1" smtClean="0"/>
+              <a:t>Allow</a:t>
+            </a:r>
+            <a:r>
+              <a:rPr lang="nl-NL" dirty="0" smtClean="0"/>
+              <a:t> </a:t>
+            </a:r>
+            <a:r>
+              <a:rPr lang="nl-NL" dirty="0" err="1" smtClean="0"/>
+              <a:t>for</a:t>
+            </a:r>
+            <a:r>
+              <a:rPr lang="nl-NL" dirty="0" smtClean="0"/>
+              <a:t> nesting of </a:t>
+            </a:r>
+            <a:r>
+              <a:rPr lang="nl-NL" dirty="0" err="1" smtClean="0"/>
+              <a:t>the</a:t>
+            </a:r>
+            <a:r>
+              <a:rPr lang="nl-NL" dirty="0" smtClean="0"/>
+              <a:t> operator</a:t>
+            </a:r>
+            <a:endParaRPr lang="nl-BE" dirty="0"/>
+          </a:p>
+        </p:txBody>
+      </p:sp>
+      <p:sp>
+        <p:nvSpPr>
+          <p:cNvPr id="4" name="Footer Placeholder 3"/>
+          <p:cNvSpPr>
+            <a:spLocks noGrp="1"/>
+          </p:cNvSpPr>
+          <p:nvPr>
+            <p:ph type="ftr" sz="quarter" idx="11"/>
+          </p:nvPr>
+        </p:nvSpPr>
+        <p:spPr/>
+        <p:txBody>
+          <a:bodyPr/>
+          <a:lstStyle/>
+          <a:p>
+            <a:r>
+              <a:rPr lang="nl-BE" dirty="0" smtClean="0"/>
+              <a:t>Titouan Vervack</a:t>
+            </a:r>
+          </a:p>
+          <a:p>
+            <a:r>
+              <a:rPr lang="nl-BE" dirty="0" smtClean="0"/>
+              <a:t>Promotor: Professor Marko van Dooren</a:t>
+            </a:r>
+            <a:endParaRPr lang="nl-BE" dirty="0"/>
+          </a:p>
+        </p:txBody>
+      </p:sp>
+      <p:sp>
+        <p:nvSpPr>
+          <p:cNvPr id="5" name="Slide Number Placeholder 4"/>
+          <p:cNvSpPr>
+            <a:spLocks noGrp="1"/>
+          </p:cNvSpPr>
+          <p:nvPr>
+            <p:ph type="sldNum" sz="quarter" idx="12"/>
+          </p:nvPr>
+        </p:nvSpPr>
+        <p:spPr/>
+        <p:txBody>
+          <a:bodyPr/>
+          <a:lstStyle/>
+          <a:p>
+            <a:fld id="{EC62D88F-3C07-4650-841D-B7EE54B2B1B9}" type="slidenum">
+              <a:rPr lang="nl-BE" smtClean="0"/>
+              <a:t>14</a:t>
+            </a:fld>
+            <a:endParaRPr lang="nl-BE"/>
+          </a:p>
+        </p:txBody>
+      </p:sp>
       <p:pic>
         <p:nvPicPr>
           <p:cNvPr id="7" name="Picture 6"/>
@@ -4527,7 +4696,7 @@
           <p:nvPr/>
         </p:nvPicPr>
         <p:blipFill rotWithShape="1">
-          <a:blip r:embed="rId3">
+          <a:blip r:embed="rId2">
             <a:extLst>
               <a:ext uri="{28A0092B-C50C-407E-A947-70E740481C1C}">
                 <a14:useLocalDpi xmlns:a14="http://schemas.microsoft.com/office/drawing/2010/main" val="0"/>
@@ -4556,7 +4725,7 @@
           <p:nvPr/>
         </p:nvPicPr>
         <p:blipFill rotWithShape="1">
-          <a:blip r:embed="rId4">
+          <a:blip r:embed="rId3">
             <a:extLst>
               <a:ext uri="{28A0092B-C50C-407E-A947-70E740481C1C}">
                 <a14:useLocalDpi xmlns:a14="http://schemas.microsoft.com/office/drawing/2010/main" val="0"/>
@@ -4576,194 +4745,15 @@
           </a:prstGeom>
         </p:spPr>
       </p:pic>
-    </p:spTree>
-    <p:extLst>
-      <p:ext uri="{BB962C8B-B14F-4D97-AF65-F5344CB8AC3E}">
-        <p14:creationId xmlns:p14="http://schemas.microsoft.com/office/powerpoint/2010/main" val="1948563523"/>
-      </p:ext>
-    </p:extLst>
-  </p:cSld>
-  <p:clrMapOvr>
-    <a:masterClrMapping/>
-  </p:clrMapOvr>
-  <p:timing>
-    <p:tnLst>
-      <p:par>
-        <p:cTn id="1" dur="indefinite" restart="never" nodeType="tmRoot"/>
-      </p:par>
-    </p:tnLst>
-  </p:timing>
-</p:sld>
-</file>
-
-<file path=ppt/slides/slide14.xml><?xml version="1.0" encoding="utf-8"?>
-<p:sld xmlns:a="http://schemas.openxmlformats.org/drawingml/2006/main" xmlns:r="http://schemas.openxmlformats.org/officeDocument/2006/relationships" xmlns:p="http://schemas.openxmlformats.org/presentationml/2006/main">
-  <p:cSld>
-    <p:spTree>
-      <p:nvGrpSpPr>
-        <p:cNvPr id="1" name=""/>
-        <p:cNvGrpSpPr/>
-        <p:nvPr/>
-      </p:nvGrpSpPr>
-      <p:grpSpPr>
-        <a:xfrm>
-          <a:off x="0" y="0"/>
-          <a:ext cx="0" cy="0"/>
-          <a:chOff x="0" y="0"/>
-          <a:chExt cx="0" cy="0"/>
-        </a:xfrm>
-      </p:grpSpPr>
-      <p:sp>
-        <p:nvSpPr>
-          <p:cNvPr id="2" name="Title 1"/>
-          <p:cNvSpPr>
-            <a:spLocks noGrp="1"/>
-          </p:cNvSpPr>
-          <p:nvPr>
-            <p:ph type="title"/>
-          </p:nvPr>
-        </p:nvSpPr>
-        <p:spPr/>
-        <p:txBody>
-          <a:bodyPr/>
-          <a:lstStyle/>
-          <a:p>
-            <a:r>
-              <a:rPr lang="nl-NL" dirty="0" err="1" smtClean="0"/>
-              <a:t>Customisability</a:t>
-            </a:r>
-            <a:r>
-              <a:rPr lang="nl-NL" dirty="0" smtClean="0"/>
-              <a:t>: </a:t>
-            </a:r>
-            <a:r>
-              <a:rPr lang="nl-NL" dirty="0" err="1" smtClean="0"/>
-              <a:t>inheritance</a:t>
-            </a:r>
-            <a:endParaRPr lang="nl-BE" dirty="0"/>
-          </a:p>
-        </p:txBody>
-      </p:sp>
       <p:pic>
         <p:nvPicPr>
-          <p:cNvPr id="6" name="Content Placeholder 5"/>
-          <p:cNvPicPr>
-            <a:picLocks noGrp="1" noChangeAspect="1"/>
-          </p:cNvPicPr>
-          <p:nvPr>
-            <p:ph idx="1"/>
-          </p:nvPr>
-        </p:nvPicPr>
-        <p:blipFill>
-          <a:blip r:embed="rId2">
-            <a:extLst>
-              <a:ext uri="{28A0092B-C50C-407E-A947-70E740481C1C}">
-                <a14:useLocalDpi xmlns:a14="http://schemas.microsoft.com/office/drawing/2010/main" val="0"/>
-              </a:ext>
-            </a:extLst>
-          </a:blip>
-          <a:stretch>
-            <a:fillRect/>
-          </a:stretch>
-        </p:blipFill>
-        <p:spPr>
-          <a:xfrm>
-            <a:off x="542101" y="1360446"/>
-            <a:ext cx="4610743" cy="2410161"/>
-          </a:xfrm>
-        </p:spPr>
-      </p:pic>
-      <p:sp>
-        <p:nvSpPr>
-          <p:cNvPr id="4" name="Footer Placeholder 3"/>
-          <p:cNvSpPr>
-            <a:spLocks noGrp="1"/>
-          </p:cNvSpPr>
-          <p:nvPr>
-            <p:ph type="ftr" sz="quarter" idx="11"/>
-          </p:nvPr>
-        </p:nvSpPr>
-        <p:spPr/>
-        <p:txBody>
-          <a:bodyPr/>
-          <a:lstStyle/>
-          <a:p>
-            <a:r>
-              <a:rPr lang="nl-BE" dirty="0" smtClean="0"/>
-              <a:t>Titouan Vervack</a:t>
-            </a:r>
-          </a:p>
-          <a:p>
-            <a:r>
-              <a:rPr lang="nl-BE" dirty="0" smtClean="0"/>
-              <a:t>Promotor: Professor Marko van Dooren</a:t>
-            </a:r>
-            <a:endParaRPr lang="nl-BE" dirty="0"/>
-          </a:p>
-        </p:txBody>
-      </p:sp>
-      <p:sp>
-        <p:nvSpPr>
-          <p:cNvPr id="5" name="Slide Number Placeholder 4"/>
-          <p:cNvSpPr>
-            <a:spLocks noGrp="1"/>
-          </p:cNvSpPr>
-          <p:nvPr>
-            <p:ph type="sldNum" sz="quarter" idx="12"/>
-          </p:nvPr>
-        </p:nvSpPr>
-        <p:spPr/>
-        <p:txBody>
-          <a:bodyPr/>
-          <a:lstStyle/>
-          <a:p>
-            <a:fld id="{EC62D88F-3C07-4650-841D-B7EE54B2B1B9}" type="slidenum">
-              <a:rPr lang="nl-BE" smtClean="0"/>
-              <a:t>14</a:t>
-            </a:fld>
-            <a:endParaRPr lang="nl-BE"/>
-          </a:p>
-        </p:txBody>
-      </p:sp>
-      <p:pic>
-        <p:nvPicPr>
-          <p:cNvPr id="7" name="Picture 6"/>
+          <p:cNvPr id="9" name="Picture 8"/>
           <p:cNvPicPr>
             <a:picLocks noChangeAspect="1"/>
           </p:cNvPicPr>
           <p:nvPr/>
         </p:nvPicPr>
-        <p:blipFill>
-          <a:blip r:embed="rId3">
-            <a:extLst>
-              <a:ext uri="{28A0092B-C50C-407E-A947-70E740481C1C}">
-                <a14:useLocalDpi xmlns:a14="http://schemas.microsoft.com/office/drawing/2010/main" val="0"/>
-              </a:ext>
-            </a:extLst>
-          </a:blip>
-          <a:stretch>
-            <a:fillRect/>
-          </a:stretch>
-        </p:blipFill>
-        <p:spPr>
-          <a:xfrm>
-            <a:off x="294396" y="3987134"/>
-            <a:ext cx="5410955" cy="2381582"/>
-          </a:xfrm>
-          <a:prstGeom prst="rect">
-            <a:avLst/>
-          </a:prstGeom>
-        </p:spPr>
-      </p:pic>
-      <p:pic>
-        <p:nvPicPr>
-          <p:cNvPr id="8" name="Picture 7"/>
-          <p:cNvPicPr>
-            <a:picLocks noChangeAspect="1"/>
-          </p:cNvPicPr>
-          <p:nvPr/>
-        </p:nvPicPr>
-        <p:blipFill>
+        <p:blipFill rotWithShape="1">
           <a:blip r:embed="rId4">
             <a:extLst>
               <a:ext uri="{28A0092B-C50C-407E-A947-70E740481C1C}">
@@ -4771,14 +4761,13 @@
               </a:ext>
             </a:extLst>
           </a:blip>
-          <a:stretch>
-            <a:fillRect/>
-          </a:stretch>
+          <a:srcRect t="74908"/>
+          <a:stretch/>
         </p:blipFill>
         <p:spPr>
           <a:xfrm>
-            <a:off x="6272464" y="1490165"/>
-            <a:ext cx="4526296" cy="4549687"/>
+            <a:off x="6106531" y="2879556"/>
+            <a:ext cx="5774324" cy="1836823"/>
           </a:xfrm>
           <a:prstGeom prst="rect">
             <a:avLst/>
@@ -4788,7 +4777,7 @@
     </p:spTree>
     <p:extLst>
       <p:ext uri="{BB962C8B-B14F-4D97-AF65-F5344CB8AC3E}">
-        <p14:creationId xmlns:p14="http://schemas.microsoft.com/office/powerpoint/2010/main" val="3285089664"/>
+        <p14:creationId xmlns:p14="http://schemas.microsoft.com/office/powerpoint/2010/main" val="1948563523"/>
       </p:ext>
     </p:extLst>
   </p:cSld>
@@ -4847,11 +4836,7 @@
             </a:r>
             <a:r>
               <a:rPr lang="nl-NL" dirty="0" err="1" smtClean="0"/>
-              <a:t>executing</a:t>
-            </a:r>
-            <a:r>
-              <a:rPr lang="nl-NL" dirty="0" smtClean="0"/>
-              <a:t> code</a:t>
+              <a:t>inheritance</a:t>
             </a:r>
             <a:endParaRPr lang="nl-BE" dirty="0"/>
           </a:p>
@@ -4904,6 +4889,220 @@
             <a:fld id="{EC62D88F-3C07-4650-841D-B7EE54B2B1B9}" type="slidenum">
               <a:rPr lang="nl-BE" smtClean="0"/>
               <a:t>15</a:t>
+            </a:fld>
+            <a:endParaRPr lang="nl-BE"/>
+          </a:p>
+        </p:txBody>
+      </p:sp>
+      <p:pic>
+        <p:nvPicPr>
+          <p:cNvPr id="7" name="Picture 6"/>
+          <p:cNvPicPr>
+            <a:picLocks noChangeAspect="1"/>
+          </p:cNvPicPr>
+          <p:nvPr/>
+        </p:nvPicPr>
+        <p:blipFill>
+          <a:blip r:embed="rId2">
+            <a:extLst>
+              <a:ext uri="{28A0092B-C50C-407E-A947-70E740481C1C}">
+                <a14:useLocalDpi xmlns:a14="http://schemas.microsoft.com/office/drawing/2010/main" val="0"/>
+              </a:ext>
+            </a:extLst>
+          </a:blip>
+          <a:stretch>
+            <a:fillRect/>
+          </a:stretch>
+        </p:blipFill>
+        <p:spPr>
+          <a:xfrm>
+            <a:off x="294396" y="3987134"/>
+            <a:ext cx="5410955" cy="2381582"/>
+          </a:xfrm>
+          <a:prstGeom prst="rect">
+            <a:avLst/>
+          </a:prstGeom>
+        </p:spPr>
+      </p:pic>
+      <p:pic>
+        <p:nvPicPr>
+          <p:cNvPr id="8" name="Picture 7"/>
+          <p:cNvPicPr>
+            <a:picLocks noChangeAspect="1"/>
+          </p:cNvPicPr>
+          <p:nvPr/>
+        </p:nvPicPr>
+        <p:blipFill>
+          <a:blip r:embed="rId3">
+            <a:extLst>
+              <a:ext uri="{28A0092B-C50C-407E-A947-70E740481C1C}">
+                <a14:useLocalDpi xmlns:a14="http://schemas.microsoft.com/office/drawing/2010/main" val="0"/>
+              </a:ext>
+            </a:extLst>
+          </a:blip>
+          <a:stretch>
+            <a:fillRect/>
+          </a:stretch>
+        </p:blipFill>
+        <p:spPr>
+          <a:xfrm>
+            <a:off x="6272464" y="1490165"/>
+            <a:ext cx="4526296" cy="4549687"/>
+          </a:xfrm>
+          <a:prstGeom prst="rect">
+            <a:avLst/>
+          </a:prstGeom>
+        </p:spPr>
+      </p:pic>
+      <p:pic>
+        <p:nvPicPr>
+          <p:cNvPr id="3" name="Picture 2"/>
+          <p:cNvPicPr>
+            <a:picLocks noChangeAspect="1"/>
+          </p:cNvPicPr>
+          <p:nvPr/>
+        </p:nvPicPr>
+        <p:blipFill>
+          <a:blip r:embed="rId4">
+            <a:extLst>
+              <a:ext uri="{28A0092B-C50C-407E-A947-70E740481C1C}">
+                <a14:useLocalDpi xmlns:a14="http://schemas.microsoft.com/office/drawing/2010/main" val="0"/>
+              </a:ext>
+            </a:extLst>
+          </a:blip>
+          <a:stretch>
+            <a:fillRect/>
+          </a:stretch>
+        </p:blipFill>
+        <p:spPr>
+          <a:xfrm>
+            <a:off x="295202" y="1339852"/>
+            <a:ext cx="4639322" cy="2381582"/>
+          </a:xfrm>
+          <a:prstGeom prst="rect">
+            <a:avLst/>
+          </a:prstGeom>
+        </p:spPr>
+      </p:pic>
+    </p:spTree>
+    <p:extLst>
+      <p:ext uri="{BB962C8B-B14F-4D97-AF65-F5344CB8AC3E}">
+        <p14:creationId xmlns:p14="http://schemas.microsoft.com/office/powerpoint/2010/main" val="3285089664"/>
+      </p:ext>
+    </p:extLst>
+  </p:cSld>
+  <p:clrMapOvr>
+    <a:masterClrMapping/>
+  </p:clrMapOvr>
+  <p:timing>
+    <p:tnLst>
+      <p:par>
+        <p:cTn id="1" dur="indefinite" restart="never" nodeType="tmRoot"/>
+      </p:par>
+    </p:tnLst>
+  </p:timing>
+</p:sld>
+</file>
+
+<file path=ppt/slides/slide16.xml><?xml version="1.0" encoding="utf-8"?>
+<p:sld xmlns:a="http://schemas.openxmlformats.org/drawingml/2006/main" xmlns:r="http://schemas.openxmlformats.org/officeDocument/2006/relationships" xmlns:p="http://schemas.openxmlformats.org/presentationml/2006/main">
+  <p:cSld>
+    <p:spTree>
+      <p:nvGrpSpPr>
+        <p:cNvPr id="1" name=""/>
+        <p:cNvGrpSpPr/>
+        <p:nvPr/>
+      </p:nvGrpSpPr>
+      <p:grpSpPr>
+        <a:xfrm>
+          <a:off x="0" y="0"/>
+          <a:ext cx="0" cy="0"/>
+          <a:chOff x="0" y="0"/>
+          <a:chExt cx="0" cy="0"/>
+        </a:xfrm>
+      </p:grpSpPr>
+      <p:sp>
+        <p:nvSpPr>
+          <p:cNvPr id="2" name="Title 1"/>
+          <p:cNvSpPr>
+            <a:spLocks noGrp="1"/>
+          </p:cNvSpPr>
+          <p:nvPr>
+            <p:ph type="title"/>
+          </p:nvPr>
+        </p:nvSpPr>
+        <p:spPr/>
+        <p:txBody>
+          <a:bodyPr/>
+          <a:lstStyle/>
+          <a:p>
+            <a:r>
+              <a:rPr lang="nl-NL" dirty="0" err="1" smtClean="0"/>
+              <a:t>Customisability</a:t>
+            </a:r>
+            <a:r>
+              <a:rPr lang="nl-NL" dirty="0" smtClean="0"/>
+              <a:t>: </a:t>
+            </a:r>
+            <a:r>
+              <a:rPr lang="nl-NL" dirty="0" err="1" smtClean="0"/>
+              <a:t>executing</a:t>
+            </a:r>
+            <a:r>
+              <a:rPr lang="nl-NL" dirty="0" smtClean="0"/>
+              <a:t> code</a:t>
+            </a:r>
+            <a:endParaRPr lang="nl-BE" dirty="0"/>
+          </a:p>
+        </p:txBody>
+      </p:sp>
+      <p:sp>
+        <p:nvSpPr>
+          <p:cNvPr id="4" name="Footer Placeholder 3"/>
+          <p:cNvSpPr>
+            <a:spLocks noGrp="1"/>
+          </p:cNvSpPr>
+          <p:nvPr>
+            <p:ph type="ftr" sz="quarter" idx="11"/>
+          </p:nvPr>
+        </p:nvSpPr>
+        <p:spPr/>
+        <p:txBody>
+          <a:bodyPr/>
+          <a:lstStyle/>
+          <a:p>
+            <a:r>
+              <a:rPr lang="nl-BE" dirty="0" smtClean="0"/>
+              <a:t>Titouan Vervack</a:t>
+            </a:r>
+          </a:p>
+          <a:p>
+            <a:r>
+              <a:rPr lang="nl-BE" dirty="0" smtClean="0"/>
+              <a:t>Promotor: Professor Marko van Dooren</a:t>
+            </a:r>
+            <a:endParaRPr lang="nl-BE" dirty="0"/>
+          </a:p>
+        </p:txBody>
+      </p:sp>
+      <p:sp>
+        <p:nvSpPr>
+          <p:cNvPr id="5" name="Slide Number Placeholder 4"/>
+          <p:cNvSpPr>
+            <a:spLocks noGrp="1"/>
+          </p:cNvSpPr>
+          <p:nvPr>
+            <p:ph type="sldNum" sz="quarter" idx="12"/>
+          </p:nvPr>
+        </p:nvSpPr>
+        <p:spPr/>
+        <p:txBody>
+          <a:bodyPr/>
+          <a:lstStyle/>
+          <a:p>
+            <a:fld id="{EC62D88F-3C07-4650-841D-B7EE54B2B1B9}" type="slidenum">
+              <a:rPr lang="nl-BE" smtClean="0"/>
+              <a:t>16</a:t>
             </a:fld>
             <a:endParaRPr lang="nl-BE"/>
           </a:p>
@@ -4988,7 +5187,7 @@
 </p:sld>
 </file>
 
-<file path=ppt/slides/slide16.xml><?xml version="1.0" encoding="utf-8"?>
+<file path=ppt/slides/slide17.xml><?xml version="1.0" encoding="utf-8"?>
 <p:sld xmlns:a="http://schemas.openxmlformats.org/drawingml/2006/main" xmlns:r="http://schemas.openxmlformats.org/officeDocument/2006/relationships" xmlns:p="http://schemas.openxmlformats.org/presentationml/2006/main">
   <p:cSld>
     <p:spTree>
@@ -5086,7 +5285,7 @@
           <a:p>
             <a:fld id="{EC62D88F-3C07-4650-841D-B7EE54B2B1B9}" type="slidenum">
               <a:rPr lang="nl-BE" smtClean="0"/>
-              <a:t>16</a:t>
+              <a:t>17</a:t>
             </a:fld>
             <a:endParaRPr lang="nl-BE"/>
           </a:p>
@@ -5267,7 +5466,7 @@
 </p:sld>
 </file>
 
-<file path=ppt/slides/slide17.xml><?xml version="1.0" encoding="utf-8"?>
+<file path=ppt/slides/slide18.xml><?xml version="1.0" encoding="utf-8"?>
 <p:sld xmlns:a="http://schemas.openxmlformats.org/drawingml/2006/main" xmlns:r="http://schemas.openxmlformats.org/officeDocument/2006/relationships" xmlns:p="http://schemas.openxmlformats.org/presentationml/2006/main">
   <p:cSld>
     <p:spTree>
@@ -5394,7 +5593,7 @@
           <a:p>
             <a:fld id="{EC62D88F-3C07-4650-841D-B7EE54B2B1B9}" type="slidenum">
               <a:rPr lang="nl-BE" smtClean="0"/>
-              <a:t>17</a:t>
+              <a:t>18</a:t>
             </a:fld>
             <a:endParaRPr lang="nl-BE"/>
           </a:p>
@@ -5480,7 +5679,407 @@
 </p:sld>
 </file>
 
-<file path=ppt/slides/slide18.xml><?xml version="1.0" encoding="utf-8"?>
+<file path=ppt/slides/slide19.xml><?xml version="1.0" encoding="utf-8"?>
+<p:sld xmlns:a="http://schemas.openxmlformats.org/drawingml/2006/main" xmlns:r="http://schemas.openxmlformats.org/officeDocument/2006/relationships" xmlns:p="http://schemas.openxmlformats.org/presentationml/2006/main">
+  <p:cSld>
+    <p:spTree>
+      <p:nvGrpSpPr>
+        <p:cNvPr id="1" name=""/>
+        <p:cNvGrpSpPr/>
+        <p:nvPr/>
+      </p:nvGrpSpPr>
+      <p:grpSpPr>
+        <a:xfrm>
+          <a:off x="0" y="0"/>
+          <a:ext cx="0" cy="0"/>
+          <a:chOff x="0" y="0"/>
+          <a:chExt cx="0" cy="0"/>
+        </a:xfrm>
+      </p:grpSpPr>
+      <p:sp>
+        <p:nvSpPr>
+          <p:cNvPr id="2" name="Title 1"/>
+          <p:cNvSpPr>
+            <a:spLocks noGrp="1"/>
+          </p:cNvSpPr>
+          <p:nvPr>
+            <p:ph type="title"/>
+          </p:nvPr>
+        </p:nvSpPr>
+        <p:spPr/>
+        <p:txBody>
+          <a:bodyPr/>
+          <a:lstStyle/>
+          <a:p>
+            <a:r>
+              <a:rPr lang="nl-NL" dirty="0" err="1" smtClean="0"/>
+              <a:t>Customisability</a:t>
+            </a:r>
+            <a:r>
+              <a:rPr lang="nl-NL" dirty="0" smtClean="0"/>
+              <a:t>: </a:t>
+            </a:r>
+            <a:r>
+              <a:rPr lang="nl-NL" dirty="0" err="1" smtClean="0"/>
+              <a:t>custom</a:t>
+            </a:r>
+            <a:r>
+              <a:rPr lang="nl-NL" dirty="0" smtClean="0"/>
+              <a:t> </a:t>
+            </a:r>
+            <a:r>
+              <a:rPr lang="nl-NL" dirty="0" err="1" smtClean="0"/>
+              <a:t>commands</a:t>
+            </a:r>
+            <a:endParaRPr lang="nl-BE" dirty="0"/>
+          </a:p>
+        </p:txBody>
+      </p:sp>
+      <p:pic>
+        <p:nvPicPr>
+          <p:cNvPr id="6" name="Content Placeholder 5"/>
+          <p:cNvPicPr>
+            <a:picLocks noGrp="1" noChangeAspect="1"/>
+          </p:cNvPicPr>
+          <p:nvPr>
+            <p:ph idx="1"/>
+          </p:nvPr>
+        </p:nvPicPr>
+        <p:blipFill>
+          <a:blip r:embed="rId3">
+            <a:extLst>
+              <a:ext uri="{28A0092B-C50C-407E-A947-70E740481C1C}">
+                <a14:useLocalDpi xmlns:a14="http://schemas.microsoft.com/office/drawing/2010/main" val="0"/>
+              </a:ext>
+            </a:extLst>
+          </a:blip>
+          <a:stretch>
+            <a:fillRect/>
+          </a:stretch>
+        </p:blipFill>
+        <p:spPr>
+          <a:xfrm>
+            <a:off x="494327" y="1625099"/>
+            <a:ext cx="4433579" cy="4351338"/>
+          </a:xfrm>
+        </p:spPr>
+      </p:pic>
+      <p:sp>
+        <p:nvSpPr>
+          <p:cNvPr id="4" name="Footer Placeholder 3"/>
+          <p:cNvSpPr>
+            <a:spLocks noGrp="1"/>
+          </p:cNvSpPr>
+          <p:nvPr>
+            <p:ph type="ftr" sz="quarter" idx="11"/>
+          </p:nvPr>
+        </p:nvSpPr>
+        <p:spPr/>
+        <p:txBody>
+          <a:bodyPr/>
+          <a:lstStyle/>
+          <a:p>
+            <a:r>
+              <a:rPr lang="nl-BE" dirty="0" smtClean="0"/>
+              <a:t>Titouan Vervack</a:t>
+            </a:r>
+          </a:p>
+          <a:p>
+            <a:r>
+              <a:rPr lang="nl-BE" dirty="0" smtClean="0"/>
+              <a:t>Promotor: Professor Marko van Dooren</a:t>
+            </a:r>
+            <a:endParaRPr lang="nl-BE" dirty="0"/>
+          </a:p>
+        </p:txBody>
+      </p:sp>
+      <p:sp>
+        <p:nvSpPr>
+          <p:cNvPr id="5" name="Slide Number Placeholder 4"/>
+          <p:cNvSpPr>
+            <a:spLocks noGrp="1"/>
+          </p:cNvSpPr>
+          <p:nvPr>
+            <p:ph type="sldNum" sz="quarter" idx="12"/>
+          </p:nvPr>
+        </p:nvSpPr>
+        <p:spPr/>
+        <p:txBody>
+          <a:bodyPr/>
+          <a:lstStyle/>
+          <a:p>
+            <a:fld id="{EC62D88F-3C07-4650-841D-B7EE54B2B1B9}" type="slidenum">
+              <a:rPr lang="nl-BE" smtClean="0"/>
+              <a:t>19</a:t>
+            </a:fld>
+            <a:endParaRPr lang="nl-BE"/>
+          </a:p>
+        </p:txBody>
+      </p:sp>
+      <p:pic>
+        <p:nvPicPr>
+          <p:cNvPr id="7" name="Picture 6"/>
+          <p:cNvPicPr>
+            <a:picLocks noChangeAspect="1"/>
+          </p:cNvPicPr>
+          <p:nvPr/>
+        </p:nvPicPr>
+        <p:blipFill>
+          <a:blip r:embed="rId4">
+            <a:extLst>
+              <a:ext uri="{28A0092B-C50C-407E-A947-70E740481C1C}">
+                <a14:useLocalDpi xmlns:a14="http://schemas.microsoft.com/office/drawing/2010/main" val="0"/>
+              </a:ext>
+            </a:extLst>
+          </a:blip>
+          <a:stretch>
+            <a:fillRect/>
+          </a:stretch>
+        </p:blipFill>
+        <p:spPr>
+          <a:xfrm>
+            <a:off x="5450365" y="2607672"/>
+            <a:ext cx="6344535" cy="2476846"/>
+          </a:xfrm>
+          <a:prstGeom prst="rect">
+            <a:avLst/>
+          </a:prstGeom>
+        </p:spPr>
+      </p:pic>
+    </p:spTree>
+    <p:extLst>
+      <p:ext uri="{BB962C8B-B14F-4D97-AF65-F5344CB8AC3E}">
+        <p14:creationId xmlns:p14="http://schemas.microsoft.com/office/powerpoint/2010/main" val="272441666"/>
+      </p:ext>
+    </p:extLst>
+  </p:cSld>
+  <p:clrMapOvr>
+    <a:masterClrMapping/>
+  </p:clrMapOvr>
+</p:sld>
+</file>
+
+<file path=ppt/slides/slide2.xml><?xml version="1.0" encoding="utf-8"?>
+<p:sld xmlns:a="http://schemas.openxmlformats.org/drawingml/2006/main" xmlns:r="http://schemas.openxmlformats.org/officeDocument/2006/relationships" xmlns:p="http://schemas.openxmlformats.org/presentationml/2006/main">
+  <p:cSld>
+    <p:spTree>
+      <p:nvGrpSpPr>
+        <p:cNvPr id="1" name=""/>
+        <p:cNvGrpSpPr/>
+        <p:nvPr/>
+      </p:nvGrpSpPr>
+      <p:grpSpPr>
+        <a:xfrm>
+          <a:off x="0" y="0"/>
+          <a:ext cx="0" cy="0"/>
+          <a:chOff x="0" y="0"/>
+          <a:chExt cx="0" cy="0"/>
+        </a:xfrm>
+      </p:grpSpPr>
+      <p:sp>
+        <p:nvSpPr>
+          <p:cNvPr id="2" name="Title 1"/>
+          <p:cNvSpPr>
+            <a:spLocks noGrp="1"/>
+          </p:cNvSpPr>
+          <p:nvPr>
+            <p:ph type="title"/>
+          </p:nvPr>
+        </p:nvSpPr>
+        <p:spPr/>
+        <p:txBody>
+          <a:bodyPr>
+            <a:normAutofit/>
+          </a:bodyPr>
+          <a:lstStyle/>
+          <a:p>
+            <a:r>
+              <a:rPr lang="nl-NL" dirty="0" err="1" smtClean="0"/>
+              <a:t>What</a:t>
+            </a:r>
+            <a:r>
+              <a:rPr lang="nl-NL" dirty="0" smtClean="0"/>
+              <a:t> is </a:t>
+            </a:r>
+            <a:r>
+              <a:rPr lang="nl-NL" dirty="0" err="1" smtClean="0"/>
+              <a:t>it</a:t>
+            </a:r>
+            <a:r>
+              <a:rPr lang="nl-NL" dirty="0" smtClean="0"/>
+              <a:t>?</a:t>
+            </a:r>
+            <a:endParaRPr lang="nl-BE" dirty="0"/>
+          </a:p>
+        </p:txBody>
+      </p:sp>
+      <p:sp>
+        <p:nvSpPr>
+          <p:cNvPr id="3" name="Content Placeholder 2"/>
+          <p:cNvSpPr>
+            <a:spLocks noGrp="1"/>
+          </p:cNvSpPr>
+          <p:nvPr>
+            <p:ph idx="1"/>
+          </p:nvPr>
+        </p:nvSpPr>
+        <p:spPr/>
+        <p:txBody>
+          <a:bodyPr/>
+          <a:lstStyle/>
+          <a:p>
+            <a:r>
+              <a:rPr lang="nl-NL" dirty="0" err="1" smtClean="0"/>
+              <a:t>Markup</a:t>
+            </a:r>
+            <a:r>
+              <a:rPr lang="nl-NL" dirty="0" smtClean="0"/>
+              <a:t> </a:t>
+            </a:r>
+            <a:r>
+              <a:rPr lang="nl-NL" dirty="0" err="1" smtClean="0"/>
+              <a:t>language</a:t>
+            </a:r>
+            <a:r>
+              <a:rPr lang="nl-NL" dirty="0" smtClean="0"/>
+              <a:t>	</a:t>
+            </a:r>
+          </a:p>
+          <a:p>
+            <a:endParaRPr lang="nl-NL" dirty="0" smtClean="0"/>
+          </a:p>
+          <a:p>
+            <a:r>
+              <a:rPr lang="nl-NL" dirty="0" err="1" smtClean="0"/>
+              <a:t>Inspired</a:t>
+            </a:r>
+            <a:r>
+              <a:rPr lang="nl-NL" dirty="0" smtClean="0"/>
+              <a:t> </a:t>
+            </a:r>
+            <a:r>
+              <a:rPr lang="nl-NL" dirty="0" err="1" smtClean="0"/>
+              <a:t>by</a:t>
+            </a:r>
+            <a:r>
+              <a:rPr lang="nl-NL" dirty="0" smtClean="0"/>
+              <a:t> </a:t>
+            </a:r>
+            <a:r>
+              <a:rPr lang="nl-NL" dirty="0" err="1" smtClean="0"/>
+              <a:t>TeX</a:t>
+            </a:r>
+            <a:r>
+              <a:rPr lang="nl-NL" dirty="0"/>
+              <a:t> </a:t>
+            </a:r>
+            <a:r>
+              <a:rPr lang="nl-NL" dirty="0" err="1" smtClean="0"/>
+              <a:t>and</a:t>
+            </a:r>
+            <a:r>
+              <a:rPr lang="nl-NL" dirty="0" smtClean="0"/>
+              <a:t> </a:t>
+            </a:r>
+            <a:r>
+              <a:rPr lang="nl-NL" dirty="0" err="1" smtClean="0"/>
+              <a:t>markdown</a:t>
+            </a:r>
+            <a:endParaRPr lang="nl-NL" dirty="0" smtClean="0"/>
+          </a:p>
+          <a:p>
+            <a:pPr marL="0" indent="0">
+              <a:buNone/>
+            </a:pPr>
+            <a:endParaRPr lang="nl-NL" dirty="0"/>
+          </a:p>
+          <a:p>
+            <a:pPr marL="0" indent="0">
+              <a:buNone/>
+            </a:pPr>
+            <a:endParaRPr lang="nl-NL" dirty="0" smtClean="0"/>
+          </a:p>
+          <a:p>
+            <a:pPr marL="0" indent="0">
+              <a:buNone/>
+            </a:pPr>
+            <a:endParaRPr lang="nl-BE" dirty="0"/>
+          </a:p>
+        </p:txBody>
+      </p:sp>
+      <p:sp>
+        <p:nvSpPr>
+          <p:cNvPr id="4" name="Footer Placeholder 3"/>
+          <p:cNvSpPr>
+            <a:spLocks noGrp="1"/>
+          </p:cNvSpPr>
+          <p:nvPr>
+            <p:ph type="ftr" sz="quarter" idx="11"/>
+          </p:nvPr>
+        </p:nvSpPr>
+        <p:spPr/>
+        <p:txBody>
+          <a:bodyPr/>
+          <a:lstStyle/>
+          <a:p>
+            <a:r>
+              <a:rPr lang="nl-BE" dirty="0" smtClean="0"/>
+              <a:t>Titouan Vervack</a:t>
+            </a:r>
+          </a:p>
+          <a:p>
+            <a:r>
+              <a:rPr lang="nl-BE" dirty="0" smtClean="0"/>
+              <a:t>Promotor: Professor Marko van Dooren</a:t>
+            </a:r>
+            <a:endParaRPr lang="nl-BE" dirty="0"/>
+          </a:p>
+        </p:txBody>
+      </p:sp>
+      <p:sp>
+        <p:nvSpPr>
+          <p:cNvPr id="5" name="Slide Number Placeholder 4"/>
+          <p:cNvSpPr>
+            <a:spLocks noGrp="1"/>
+          </p:cNvSpPr>
+          <p:nvPr>
+            <p:ph type="sldNum" sz="quarter" idx="12"/>
+          </p:nvPr>
+        </p:nvSpPr>
+        <p:spPr/>
+        <p:txBody>
+          <a:bodyPr/>
+          <a:lstStyle/>
+          <a:p>
+            <a:fld id="{EC62D88F-3C07-4650-841D-B7EE54B2B1B9}" type="slidenum">
+              <a:rPr lang="nl-BE" smtClean="0"/>
+              <a:t>2</a:t>
+            </a:fld>
+            <a:endParaRPr lang="nl-BE"/>
+          </a:p>
+        </p:txBody>
+      </p:sp>
+    </p:spTree>
+    <p:extLst>
+      <p:ext uri="{BB962C8B-B14F-4D97-AF65-F5344CB8AC3E}">
+        <p14:creationId xmlns:p14="http://schemas.microsoft.com/office/powerpoint/2010/main" val="1644689065"/>
+      </p:ext>
+    </p:extLst>
+  </p:cSld>
+  <p:clrMapOvr>
+    <a:masterClrMapping/>
+  </p:clrMapOvr>
+  <p:timing>
+    <p:tnLst>
+      <p:par>
+        <p:cTn id="1" dur="indefinite" restart="never" nodeType="tmRoot"/>
+      </p:par>
+    </p:tnLst>
+  </p:timing>
+</p:sld>
+</file>
+
+<file path=ppt/slides/slide20.xml><?xml version="1.0" encoding="utf-8"?>
 <p:sld xmlns:a="http://schemas.openxmlformats.org/drawingml/2006/main" xmlns:r="http://schemas.openxmlformats.org/officeDocument/2006/relationships" xmlns:p="http://schemas.openxmlformats.org/presentationml/2006/main">
   <p:cSld>
     <p:spTree>
@@ -5603,7 +6202,7 @@
           <a:p>
             <a:fld id="{EC62D88F-3C07-4650-841D-B7EE54B2B1B9}" type="slidenum">
               <a:rPr lang="nl-BE" smtClean="0"/>
-              <a:t>18</a:t>
+              <a:t>20</a:t>
             </a:fld>
             <a:endParaRPr lang="nl-BE"/>
           </a:p>
@@ -5719,7 +6318,7 @@
 </p:sld>
 </file>
 
-<file path=ppt/slides/slide19.xml><?xml version="1.0" encoding="utf-8"?>
+<file path=ppt/slides/slide21.xml><?xml version="1.0" encoding="utf-8"?>
 <p:sld xmlns:a="http://schemas.openxmlformats.org/drawingml/2006/main" xmlns:r="http://schemas.openxmlformats.org/officeDocument/2006/relationships" xmlns:p="http://schemas.openxmlformats.org/presentationml/2006/main">
   <p:cSld>
     <p:spTree>
@@ -5864,19 +6463,11 @@
             </a:r>
             <a:r>
               <a:rPr lang="nl-NL" dirty="0" err="1" smtClean="0"/>
-              <a:t>documentclassse</a:t>
-            </a:r>
-            <a:r>
-              <a:rPr lang="nl-NL" dirty="0" err="1" smtClean="0"/>
-              <a:t>s</a:t>
-            </a:r>
-            <a:r>
-              <a:rPr lang="nl-NL" dirty="0" smtClean="0"/>
-              <a:t> </a:t>
-            </a:r>
-            <a:r>
-              <a:rPr lang="nl-NL" dirty="0" smtClean="0"/>
-              <a:t>(</a:t>
+              <a:t>documentclassses</a:t>
+            </a:r>
+            <a:r>
+              <a:rPr lang="nl-NL" dirty="0" smtClean="0"/>
+              <a:t> (</a:t>
             </a:r>
             <a:r>
               <a:rPr lang="nl-NL" dirty="0" err="1" smtClean="0"/>
@@ -5894,7 +6485,6 @@
               <a:rPr lang="nl-NL" dirty="0" smtClean="0"/>
               <a:t>,…)</a:t>
             </a:r>
-            <a:endParaRPr lang="nl-NL" dirty="0" smtClean="0"/>
           </a:p>
         </p:txBody>
       </p:sp>
@@ -5944,7 +6534,7 @@
           <a:p>
             <a:fld id="{EC62D88F-3C07-4650-841D-B7EE54B2B1B9}" type="slidenum">
               <a:rPr lang="nl-BE" smtClean="0"/>
-              <a:t>19</a:t>
+              <a:t>21</a:t>
             </a:fld>
             <a:endParaRPr lang="nl-BE"/>
           </a:p>
@@ -5970,7 +6560,7 @@
 </p:sld>
 </file>
 
-<file path=ppt/slides/slide2.xml><?xml version="1.0" encoding="utf-8"?>
+<file path=ppt/slides/slide22.xml><?xml version="1.0" encoding="utf-8"?>
 <p:sld xmlns:a="http://schemas.openxmlformats.org/drawingml/2006/main" xmlns:r="http://schemas.openxmlformats.org/officeDocument/2006/relationships" xmlns:p="http://schemas.openxmlformats.org/presentationml/2006/main">
   <p:cSld>
     <p:spTree>
@@ -5999,26 +6589,24 @@
         </p:nvSpPr>
         <p:spPr/>
         <p:txBody>
-          <a:bodyPr>
-            <a:normAutofit/>
-          </a:bodyPr>
-          <a:lstStyle/>
-          <a:p>
-            <a:r>
-              <a:rPr lang="nl-NL" dirty="0" err="1" smtClean="0"/>
-              <a:t>What</a:t>
-            </a:r>
-            <a:r>
-              <a:rPr lang="nl-NL" dirty="0" smtClean="0"/>
-              <a:t> is </a:t>
-            </a:r>
-            <a:r>
-              <a:rPr lang="nl-NL" dirty="0" err="1" smtClean="0"/>
-              <a:t>it</a:t>
-            </a:r>
-            <a:r>
-              <a:rPr lang="nl-NL" dirty="0" smtClean="0"/>
-              <a:t>?</a:t>
+          <a:bodyPr/>
+          <a:lstStyle/>
+          <a:p>
+            <a:r>
+              <a:rPr lang="nl-NL" dirty="0" err="1" smtClean="0"/>
+              <a:t>Future</a:t>
+            </a:r>
+            <a:r>
+              <a:rPr lang="nl-NL" dirty="0" smtClean="0"/>
+              <a:t> </a:t>
+            </a:r>
+            <a:r>
+              <a:rPr lang="nl-NL" dirty="0" err="1" smtClean="0"/>
+              <a:t>work</a:t>
+            </a:r>
+            <a:r>
+              <a:rPr lang="nl-NL" dirty="0" smtClean="0"/>
+              <a:t>	</a:t>
             </a:r>
             <a:endParaRPr lang="nl-BE" dirty="0"/>
           </a:p>
@@ -6040,8 +6628,12 @@
           <a:lstStyle/>
           <a:p>
             <a:r>
-              <a:rPr lang="nl-NL" dirty="0" err="1" smtClean="0"/>
-              <a:t>Markup</a:t>
+              <a:rPr lang="nl-NL" dirty="0" smtClean="0"/>
+              <a:t>Native output </a:t>
+            </a:r>
+            <a:r>
+              <a:rPr lang="nl-NL" dirty="0" err="1" smtClean="0"/>
+              <a:t>to</a:t>
             </a:r>
             <a:r>
               <a:rPr lang="nl-NL" dirty="0" smtClean="0"/>
@@ -6049,11 +6641,27 @@
             </a:r>
             <a:r>
               <a:rPr lang="nl-NL" dirty="0" err="1" smtClean="0"/>
-              <a:t>language</a:t>
-            </a:r>
-            <a:r>
-              <a:rPr lang="nl-NL" dirty="0" smtClean="0"/>
-              <a:t>	</a:t>
+              <a:t>languages</a:t>
+            </a:r>
+            <a:r>
+              <a:rPr lang="nl-NL" dirty="0" smtClean="0"/>
+              <a:t> </a:t>
+            </a:r>
+            <a:r>
+              <a:rPr lang="nl-NL" dirty="0" err="1" smtClean="0"/>
+              <a:t>other</a:t>
+            </a:r>
+            <a:r>
+              <a:rPr lang="nl-NL" dirty="0" smtClean="0"/>
+              <a:t> </a:t>
+            </a:r>
+            <a:r>
+              <a:rPr lang="nl-NL" dirty="0" err="1" smtClean="0"/>
+              <a:t>than</a:t>
+            </a:r>
+            <a:r>
+              <a:rPr lang="nl-NL" dirty="0" smtClean="0"/>
+              <a:t> latex</a:t>
             </a:r>
           </a:p>
           <a:p>
@@ -6062,7 +6670,7 @@
           <a:p>
             <a:r>
               <a:rPr lang="nl-NL" dirty="0" err="1" smtClean="0"/>
-              <a:t>Inspired</a:t>
+              <a:t>Further</a:t>
             </a:r>
             <a:r>
               <a:rPr lang="nl-NL" dirty="0" smtClean="0"/>
@@ -6070,7 +6678,15 @@
             </a:r>
             <a:r>
               <a:rPr lang="nl-NL" dirty="0" err="1" smtClean="0"/>
-              <a:t>by</a:t>
+              <a:t>implementation</a:t>
+            </a:r>
+            <a:r>
+              <a:rPr lang="nl-NL" dirty="0" smtClean="0"/>
+              <a:t> of </a:t>
+            </a:r>
+            <a:r>
+              <a:rPr lang="nl-NL" dirty="0" err="1" smtClean="0"/>
+              <a:t>commonly</a:t>
             </a:r>
             <a:r>
               <a:rPr lang="nl-NL" dirty="0" smtClean="0"/>
@@ -6078,71 +6694,50 @@
             </a:r>
             <a:r>
               <a:rPr lang="nl-NL" dirty="0" err="1" smtClean="0"/>
-              <a:t>TeX</a:t>
-            </a:r>
-            <a:r>
-              <a:rPr lang="nl-NL" dirty="0"/>
+              <a:t>used</a:t>
+            </a:r>
+            <a:r>
+              <a:rPr lang="nl-NL" dirty="0" smtClean="0"/>
+              <a:t> latex packages</a:t>
+            </a:r>
+          </a:p>
+          <a:p>
+            <a:endParaRPr lang="nl-NL" dirty="0"/>
+          </a:p>
+          <a:p>
+            <a:r>
+              <a:rPr lang="nl-NL" dirty="0" smtClean="0"/>
+              <a:t>Compiler </a:t>
+            </a:r>
+            <a:r>
+              <a:rPr lang="nl-NL" dirty="0" err="1" smtClean="0"/>
+              <a:t>optimizations</a:t>
+            </a:r>
+            <a:endParaRPr lang="nl-NL" dirty="0" smtClean="0"/>
+          </a:p>
+          <a:p>
+            <a:endParaRPr lang="nl-NL" dirty="0"/>
+          </a:p>
+          <a:p>
+            <a:r>
+              <a:rPr lang="nl-NL" dirty="0" smtClean="0"/>
+              <a:t>Automatic double latex </a:t>
+            </a:r>
+            <a:r>
+              <a:rPr lang="nl-NL" dirty="0" err="1" smtClean="0"/>
+              <a:t>compile</a:t>
+            </a:r>
+            <a:r>
+              <a:rPr lang="nl-NL" dirty="0" smtClean="0"/>
               <a:t> </a:t>
             </a:r>
             <a:r>
               <a:rPr lang="nl-NL" dirty="0" err="1" smtClean="0"/>
-              <a:t>and</a:t>
-            </a:r>
-            <a:r>
-              <a:rPr lang="nl-NL" dirty="0" smtClean="0"/>
-              <a:t> </a:t>
-            </a:r>
-            <a:r>
-              <a:rPr lang="nl-NL" dirty="0" err="1" smtClean="0"/>
-              <a:t>markdown</a:t>
+              <a:t>detection</a:t>
             </a:r>
             <a:endParaRPr lang="nl-NL" dirty="0" smtClean="0"/>
           </a:p>
           <a:p>
-            <a:pPr marL="0" indent="0">
-              <a:buNone/>
-            </a:pPr>
-            <a:endParaRPr lang="nl-NL" dirty="0"/>
-          </a:p>
-          <a:p>
-            <a:pPr marL="0" indent="0">
-              <a:buNone/>
-            </a:pPr>
-            <a:endParaRPr lang="nl-NL" dirty="0" smtClean="0"/>
-          </a:p>
-          <a:p>
-            <a:pPr marL="0" indent="0">
-              <a:buNone/>
-            </a:pPr>
-            <a:endParaRPr lang="nl-BE" dirty="0"/>
-          </a:p>
-        </p:txBody>
-      </p:sp>
-      <p:sp>
-        <p:nvSpPr>
-          <p:cNvPr id="4" name="Footer Placeholder 3"/>
-          <p:cNvSpPr>
-            <a:spLocks noGrp="1"/>
-          </p:cNvSpPr>
-          <p:nvPr>
-            <p:ph type="ftr" sz="quarter" idx="11"/>
-          </p:nvPr>
-        </p:nvSpPr>
-        <p:spPr/>
-        <p:txBody>
-          <a:bodyPr/>
-          <a:lstStyle/>
-          <a:p>
-            <a:r>
-              <a:rPr lang="nl-BE" dirty="0" smtClean="0"/>
-              <a:t>Titouan Vervack</a:t>
-            </a:r>
-          </a:p>
-          <a:p>
-            <a:r>
-              <a:rPr lang="nl-BE" dirty="0" smtClean="0"/>
-              <a:t>Promotor: Professor Marko van Dooren</a:t>
-            </a:r>
             <a:endParaRPr lang="nl-BE" dirty="0"/>
           </a:p>
         </p:txBody>
@@ -6164,240 +6759,7 @@
           <a:p>
             <a:fld id="{EC62D88F-3C07-4650-841D-B7EE54B2B1B9}" type="slidenum">
               <a:rPr lang="nl-BE" smtClean="0"/>
-              <a:t>2</a:t>
-            </a:fld>
-            <a:endParaRPr lang="nl-BE"/>
-          </a:p>
-        </p:txBody>
-      </p:sp>
-    </p:spTree>
-    <p:extLst>
-      <p:ext uri="{BB962C8B-B14F-4D97-AF65-F5344CB8AC3E}">
-        <p14:creationId xmlns:p14="http://schemas.microsoft.com/office/powerpoint/2010/main" val="1644689065"/>
-      </p:ext>
-    </p:extLst>
-  </p:cSld>
-  <p:clrMapOvr>
-    <a:masterClrMapping/>
-  </p:clrMapOvr>
-  <p:timing>
-    <p:tnLst>
-      <p:par>
-        <p:cTn id="1" dur="indefinite" restart="never" nodeType="tmRoot"/>
-      </p:par>
-    </p:tnLst>
-  </p:timing>
-</p:sld>
-</file>
-
-<file path=ppt/slides/slide20.xml><?xml version="1.0" encoding="utf-8"?>
-<p:sld xmlns:a="http://schemas.openxmlformats.org/drawingml/2006/main" xmlns:r="http://schemas.openxmlformats.org/officeDocument/2006/relationships" xmlns:p="http://schemas.openxmlformats.org/presentationml/2006/main">
-  <p:cSld>
-    <p:spTree>
-      <p:nvGrpSpPr>
-        <p:cNvPr id="1" name=""/>
-        <p:cNvGrpSpPr/>
-        <p:nvPr/>
-      </p:nvGrpSpPr>
-      <p:grpSpPr>
-        <a:xfrm>
-          <a:off x="0" y="0"/>
-          <a:ext cx="0" cy="0"/>
-          <a:chOff x="0" y="0"/>
-          <a:chExt cx="0" cy="0"/>
-        </a:xfrm>
-      </p:grpSpPr>
-      <p:sp>
-        <p:nvSpPr>
-          <p:cNvPr id="2" name="Title 1"/>
-          <p:cNvSpPr>
-            <a:spLocks noGrp="1"/>
-          </p:cNvSpPr>
-          <p:nvPr>
-            <p:ph type="title"/>
-          </p:nvPr>
-        </p:nvSpPr>
-        <p:spPr/>
-        <p:txBody>
-          <a:bodyPr/>
-          <a:lstStyle/>
-          <a:p>
-            <a:r>
-              <a:rPr lang="nl-NL" dirty="0" err="1" smtClean="0"/>
-              <a:t>Future</a:t>
-            </a:r>
-            <a:r>
-              <a:rPr lang="nl-NL" dirty="0" smtClean="0"/>
-              <a:t> </a:t>
-            </a:r>
-            <a:r>
-              <a:rPr lang="nl-NL" dirty="0" err="1" smtClean="0"/>
-              <a:t>work</a:t>
-            </a:r>
-            <a:r>
-              <a:rPr lang="nl-NL" dirty="0" smtClean="0"/>
-              <a:t>	</a:t>
-            </a:r>
-            <a:endParaRPr lang="nl-BE" dirty="0"/>
-          </a:p>
-        </p:txBody>
-      </p:sp>
-      <p:sp>
-        <p:nvSpPr>
-          <p:cNvPr id="3" name="Content Placeholder 2"/>
-          <p:cNvSpPr>
-            <a:spLocks noGrp="1"/>
-          </p:cNvSpPr>
-          <p:nvPr>
-            <p:ph idx="1"/>
-          </p:nvPr>
-        </p:nvSpPr>
-        <p:spPr/>
-        <p:txBody>
-          <a:bodyPr/>
-          <a:lstStyle/>
-          <a:p>
-            <a:r>
-              <a:rPr lang="nl-NL" dirty="0" smtClean="0"/>
-              <a:t>Native output </a:t>
-            </a:r>
-            <a:r>
-              <a:rPr lang="nl-NL" dirty="0" err="1" smtClean="0"/>
-              <a:t>to</a:t>
-            </a:r>
-            <a:r>
-              <a:rPr lang="nl-NL" dirty="0" smtClean="0"/>
-              <a:t> </a:t>
-            </a:r>
-            <a:r>
-              <a:rPr lang="nl-NL" dirty="0" err="1" smtClean="0"/>
-              <a:t>languages</a:t>
-            </a:r>
-            <a:r>
-              <a:rPr lang="nl-NL" dirty="0" smtClean="0"/>
-              <a:t> </a:t>
-            </a:r>
-            <a:r>
-              <a:rPr lang="nl-NL" dirty="0" err="1" smtClean="0"/>
-              <a:t>other</a:t>
-            </a:r>
-            <a:r>
-              <a:rPr lang="nl-NL" dirty="0" smtClean="0"/>
-              <a:t> </a:t>
-            </a:r>
-            <a:r>
-              <a:rPr lang="nl-NL" dirty="0" err="1" smtClean="0"/>
-              <a:t>than</a:t>
-            </a:r>
-            <a:r>
-              <a:rPr lang="nl-NL" dirty="0" smtClean="0"/>
-              <a:t> latex</a:t>
-            </a:r>
-          </a:p>
-          <a:p>
-            <a:endParaRPr lang="nl-NL" dirty="0" smtClean="0"/>
-          </a:p>
-          <a:p>
-            <a:r>
-              <a:rPr lang="nl-NL" dirty="0" err="1" smtClean="0"/>
-              <a:t>Further</a:t>
-            </a:r>
-            <a:r>
-              <a:rPr lang="nl-NL" dirty="0" smtClean="0"/>
-              <a:t> </a:t>
-            </a:r>
-            <a:r>
-              <a:rPr lang="nl-NL" dirty="0" err="1" smtClean="0"/>
-              <a:t>implementation</a:t>
-            </a:r>
-            <a:r>
-              <a:rPr lang="nl-NL" dirty="0" smtClean="0"/>
-              <a:t> </a:t>
-            </a:r>
-            <a:r>
-              <a:rPr lang="nl-NL" dirty="0" smtClean="0"/>
-              <a:t>of </a:t>
-            </a:r>
-            <a:r>
-              <a:rPr lang="nl-NL" dirty="0" err="1" smtClean="0"/>
-              <a:t>commonly</a:t>
-            </a:r>
-            <a:r>
-              <a:rPr lang="nl-NL" dirty="0" smtClean="0"/>
-              <a:t> </a:t>
-            </a:r>
-            <a:r>
-              <a:rPr lang="nl-NL" dirty="0" err="1" smtClean="0"/>
-              <a:t>used</a:t>
-            </a:r>
-            <a:r>
-              <a:rPr lang="nl-NL" dirty="0" smtClean="0"/>
-              <a:t> latex </a:t>
-            </a:r>
-            <a:r>
-              <a:rPr lang="nl-NL" dirty="0" smtClean="0"/>
-              <a:t>packages</a:t>
-            </a:r>
-          </a:p>
-          <a:p>
-            <a:endParaRPr lang="nl-NL" dirty="0"/>
-          </a:p>
-          <a:p>
-            <a:r>
-              <a:rPr lang="nl-NL" dirty="0" smtClean="0"/>
-              <a:t>Compiler </a:t>
-            </a:r>
-            <a:r>
-              <a:rPr lang="nl-NL" dirty="0" err="1" smtClean="0"/>
-              <a:t>optimizations</a:t>
-            </a:r>
-            <a:endParaRPr lang="nl-NL" dirty="0" smtClean="0"/>
-          </a:p>
-          <a:p>
-            <a:endParaRPr lang="nl-NL" dirty="0"/>
-          </a:p>
-          <a:p>
-            <a:r>
-              <a:rPr lang="nl-NL" dirty="0" smtClean="0"/>
-              <a:t>Automatic double latex </a:t>
-            </a:r>
-            <a:r>
-              <a:rPr lang="nl-NL" dirty="0" err="1" smtClean="0"/>
-              <a:t>compile</a:t>
-            </a:r>
-            <a:r>
-              <a:rPr lang="nl-NL" dirty="0" smtClean="0"/>
-              <a:t> </a:t>
-            </a:r>
-            <a:r>
-              <a:rPr lang="nl-NL" dirty="0" err="1" smtClean="0"/>
-              <a:t>detection</a:t>
-            </a:r>
-            <a:endParaRPr lang="nl-NL" dirty="0" smtClean="0"/>
-          </a:p>
-          <a:p>
-            <a:endParaRPr lang="nl-BE" dirty="0"/>
-          </a:p>
-        </p:txBody>
-      </p:sp>
-      <p:sp>
-        <p:nvSpPr>
-          <p:cNvPr id="5" name="Slide Number Placeholder 4"/>
-          <p:cNvSpPr>
-            <a:spLocks noGrp="1"/>
-          </p:cNvSpPr>
-          <p:nvPr>
-            <p:ph type="sldNum" sz="quarter" idx="12"/>
-          </p:nvPr>
-        </p:nvSpPr>
-        <p:spPr/>
-        <p:txBody>
-          <a:bodyPr/>
-          <a:lstStyle/>
-          <a:p>
-            <a:fld id="{EC62D88F-3C07-4650-841D-B7EE54B2B1B9}" type="slidenum">
-              <a:rPr lang="nl-BE" smtClean="0"/>
-              <a:t>20</a:t>
+              <a:t>22</a:t>
             </a:fld>
             <a:endParaRPr lang="nl-BE"/>
           </a:p>
@@ -7617,11 +7979,7 @@
             </a:r>
             <a:r>
               <a:rPr lang="nl-NL" dirty="0" smtClean="0"/>
-              <a:t> </a:t>
-            </a:r>
-            <a:r>
-              <a:rPr lang="nl-NL" dirty="0" smtClean="0"/>
-              <a:t>syntax</a:t>
+              <a:t> syntax</a:t>
             </a:r>
           </a:p>
           <a:p>
@@ -7703,7 +8061,7 @@
       </p:sp>
       <p:pic>
         <p:nvPicPr>
-          <p:cNvPr id="7" name="Picture 6"/>
+          <p:cNvPr id="6" name="Picture 5"/>
           <p:cNvPicPr>
             <a:picLocks noChangeAspect="1"/>
           </p:cNvPicPr>
@@ -7723,8 +8081,8 @@
         </p:blipFill>
         <p:spPr>
           <a:xfrm>
-            <a:off x="5011831" y="176463"/>
-            <a:ext cx="4066750" cy="6039853"/>
+            <a:off x="5013157" y="272716"/>
+            <a:ext cx="4653887" cy="5900009"/>
           </a:xfrm>
           <a:prstGeom prst="rect">
             <a:avLst/>

</xml_diff>

<commit_message>
Added positive points for alternatives
</commit_message>
<xml_diff>
--- a/presentation/Intermediate Presentation.pptx
+++ b/presentation/Intermediate Presentation.pptx
@@ -218,7 +218,7 @@
           <a:p>
             <a:fld id="{01963D08-B959-4AB6-95BF-A28840883159}" type="datetimeFigureOut">
               <a:rPr lang="nl-BE" smtClean="0"/>
-              <a:t>16/03/2016</a:t>
+              <a:t>18/03/2016</a:t>
             </a:fld>
             <a:endParaRPr lang="nl-BE"/>
           </a:p>
@@ -377,7 +377,7 @@
           <a:p>
             <a:fld id="{3393AA9F-D72C-463D-9782-972043CF7B88}" type="slidenum">
               <a:rPr lang="nl-BE" smtClean="0"/>
-              <a:t>‹#›</a:t>
+              <a:t>‹nr.›</a:t>
             </a:fld>
             <a:endParaRPr lang="nl-BE"/>
           </a:p>
@@ -953,7 +953,7 @@
           <a:p>
             <a:fld id="{9E72DAE6-35CB-4F75-B445-E63BA6E6BE9D}" type="datetime1">
               <a:rPr lang="nl-BE" smtClean="0"/>
-              <a:t>16/03/2016</a:t>
+              <a:t>18/03/2016</a:t>
             </a:fld>
             <a:endParaRPr lang="nl-BE"/>
           </a:p>
@@ -999,7 +999,7 @@
           <a:p>
             <a:fld id="{EC62D88F-3C07-4650-841D-B7EE54B2B1B9}" type="slidenum">
               <a:rPr lang="nl-BE" smtClean="0"/>
-              <a:t>‹#›</a:t>
+              <a:t>‹nr.›</a:t>
             </a:fld>
             <a:endParaRPr lang="nl-BE"/>
           </a:p>
@@ -1127,7 +1127,7 @@
           <a:p>
             <a:fld id="{AB3B8E0A-2F7D-4C42-A4F7-EA05A5027511}" type="datetime1">
               <a:rPr lang="nl-BE" smtClean="0"/>
-              <a:t>16/03/2016</a:t>
+              <a:t>18/03/2016</a:t>
             </a:fld>
             <a:endParaRPr lang="nl-BE"/>
           </a:p>
@@ -1173,7 +1173,7 @@
           <a:p>
             <a:fld id="{EC62D88F-3C07-4650-841D-B7EE54B2B1B9}" type="slidenum">
               <a:rPr lang="nl-BE" smtClean="0"/>
-              <a:t>‹#›</a:t>
+              <a:t>‹nr.›</a:t>
             </a:fld>
             <a:endParaRPr lang="nl-BE"/>
           </a:p>
@@ -1311,7 +1311,7 @@
           <a:p>
             <a:fld id="{2931C40C-86C9-4653-BEC0-4FB034E8A536}" type="datetime1">
               <a:rPr lang="nl-BE" smtClean="0"/>
-              <a:t>16/03/2016</a:t>
+              <a:t>18/03/2016</a:t>
             </a:fld>
             <a:endParaRPr lang="nl-BE"/>
           </a:p>
@@ -1357,7 +1357,7 @@
           <a:p>
             <a:fld id="{EC62D88F-3C07-4650-841D-B7EE54B2B1B9}" type="slidenum">
               <a:rPr lang="nl-BE" smtClean="0"/>
-              <a:t>‹#›</a:t>
+              <a:t>‹nr.›</a:t>
             </a:fld>
             <a:endParaRPr lang="nl-BE"/>
           </a:p>
@@ -1485,7 +1485,7 @@
           <a:p>
             <a:fld id="{1928B6EA-3481-40C9-8B91-73902F4E22C5}" type="datetime1">
               <a:rPr lang="nl-BE" smtClean="0"/>
-              <a:t>16/03/2016</a:t>
+              <a:t>18/03/2016</a:t>
             </a:fld>
             <a:endParaRPr lang="nl-BE"/>
           </a:p>
@@ -1531,7 +1531,7 @@
           <a:p>
             <a:fld id="{EC62D88F-3C07-4650-841D-B7EE54B2B1B9}" type="slidenum">
               <a:rPr lang="nl-BE" smtClean="0"/>
-              <a:t>‹#›</a:t>
+              <a:t>‹nr.›</a:t>
             </a:fld>
             <a:endParaRPr lang="nl-BE"/>
           </a:p>
@@ -1735,7 +1735,7 @@
           <a:p>
             <a:fld id="{A76593C9-74D7-46BC-9A16-90B18C8AEAE6}" type="datetime1">
               <a:rPr lang="nl-BE" smtClean="0"/>
-              <a:t>16/03/2016</a:t>
+              <a:t>18/03/2016</a:t>
             </a:fld>
             <a:endParaRPr lang="nl-BE"/>
           </a:p>
@@ -1781,7 +1781,7 @@
           <a:p>
             <a:fld id="{EC62D88F-3C07-4650-841D-B7EE54B2B1B9}" type="slidenum">
               <a:rPr lang="nl-BE" smtClean="0"/>
-              <a:t>‹#›</a:t>
+              <a:t>‹nr.›</a:t>
             </a:fld>
             <a:endParaRPr lang="nl-BE"/>
           </a:p>
@@ -1971,7 +1971,7 @@
           <a:p>
             <a:fld id="{AF988A33-DBC2-4F3C-8E3E-C5BCA46411FA}" type="datetime1">
               <a:rPr lang="nl-BE" smtClean="0"/>
-              <a:t>16/03/2016</a:t>
+              <a:t>18/03/2016</a:t>
             </a:fld>
             <a:endParaRPr lang="nl-BE"/>
           </a:p>
@@ -2017,7 +2017,7 @@
           <a:p>
             <a:fld id="{EC62D88F-3C07-4650-841D-B7EE54B2B1B9}" type="slidenum">
               <a:rPr lang="nl-BE" smtClean="0"/>
-              <a:t>‹#›</a:t>
+              <a:t>‹nr.›</a:t>
             </a:fld>
             <a:endParaRPr lang="nl-BE"/>
           </a:p>
@@ -2342,7 +2342,7 @@
           <a:p>
             <a:fld id="{101A8F35-61A6-4FCE-98C1-BD56B64042FD}" type="datetime1">
               <a:rPr lang="nl-BE" smtClean="0"/>
-              <a:t>16/03/2016</a:t>
+              <a:t>18/03/2016</a:t>
             </a:fld>
             <a:endParaRPr lang="nl-BE"/>
           </a:p>
@@ -2388,7 +2388,7 @@
           <a:p>
             <a:fld id="{EC62D88F-3C07-4650-841D-B7EE54B2B1B9}" type="slidenum">
               <a:rPr lang="nl-BE" smtClean="0"/>
-              <a:t>‹#›</a:t>
+              <a:t>‹nr.›</a:t>
             </a:fld>
             <a:endParaRPr lang="nl-BE"/>
           </a:p>
@@ -2464,7 +2464,7 @@
           <a:p>
             <a:fld id="{A3AB6747-8571-485F-8138-80A60DD0F67C}" type="datetime1">
               <a:rPr lang="nl-BE" smtClean="0"/>
-              <a:t>16/03/2016</a:t>
+              <a:t>18/03/2016</a:t>
             </a:fld>
             <a:endParaRPr lang="nl-BE"/>
           </a:p>
@@ -2510,7 +2510,7 @@
           <a:p>
             <a:fld id="{EC62D88F-3C07-4650-841D-B7EE54B2B1B9}" type="slidenum">
               <a:rPr lang="nl-BE" smtClean="0"/>
-              <a:t>‹#›</a:t>
+              <a:t>‹nr.›</a:t>
             </a:fld>
             <a:endParaRPr lang="nl-BE"/>
           </a:p>
@@ -2563,7 +2563,7 @@
           <a:p>
             <a:fld id="{9A50E496-7786-4BD6-9882-6AE5A6512998}" type="datetime1">
               <a:rPr lang="nl-BE" smtClean="0"/>
-              <a:t>16/03/2016</a:t>
+              <a:t>18/03/2016</a:t>
             </a:fld>
             <a:endParaRPr lang="nl-BE"/>
           </a:p>
@@ -2609,7 +2609,7 @@
           <a:p>
             <a:fld id="{EC62D88F-3C07-4650-841D-B7EE54B2B1B9}" type="slidenum">
               <a:rPr lang="nl-BE" smtClean="0"/>
-              <a:t>‹#›</a:t>
+              <a:t>‹nr.›</a:t>
             </a:fld>
             <a:endParaRPr lang="nl-BE"/>
           </a:p>
@@ -2844,7 +2844,7 @@
           <a:p>
             <a:fld id="{80C7D598-A32E-4E16-9D25-37512F304E09}" type="datetime1">
               <a:rPr lang="nl-BE" smtClean="0"/>
-              <a:t>16/03/2016</a:t>
+              <a:t>18/03/2016</a:t>
             </a:fld>
             <a:endParaRPr lang="nl-BE"/>
           </a:p>
@@ -2890,7 +2890,7 @@
           <a:p>
             <a:fld id="{EC62D88F-3C07-4650-841D-B7EE54B2B1B9}" type="slidenum">
               <a:rPr lang="nl-BE" smtClean="0"/>
-              <a:t>‹#›</a:t>
+              <a:t>‹nr.›</a:t>
             </a:fld>
             <a:endParaRPr lang="nl-BE"/>
           </a:p>
@@ -3101,7 +3101,7 @@
           <a:p>
             <a:fld id="{F5909C26-1E95-4033-8084-732BC7DA3826}" type="datetime1">
               <a:rPr lang="nl-BE" smtClean="0"/>
-              <a:t>16/03/2016</a:t>
+              <a:t>18/03/2016</a:t>
             </a:fld>
             <a:endParaRPr lang="nl-BE"/>
           </a:p>
@@ -3147,7 +3147,7 @@
           <a:p>
             <a:fld id="{EC62D88F-3C07-4650-841D-B7EE54B2B1B9}" type="slidenum">
               <a:rPr lang="nl-BE" smtClean="0"/>
-              <a:t>‹#›</a:t>
+              <a:t>‹nr.›</a:t>
             </a:fld>
             <a:endParaRPr lang="nl-BE"/>
           </a:p>
@@ -3318,7 +3318,7 @@
           <a:p>
             <a:fld id="{ADED6692-0A52-436D-84AE-22609B4C7703}" type="datetime1">
               <a:rPr lang="nl-BE" smtClean="0"/>
-              <a:t>16/03/2016</a:t>
+              <a:t>18/03/2016</a:t>
             </a:fld>
             <a:endParaRPr lang="nl-BE"/>
           </a:p>
@@ -3400,7 +3400,7 @@
           <a:p>
             <a:fld id="{EC62D88F-3C07-4650-841D-B7EE54B2B1B9}" type="slidenum">
               <a:rPr lang="nl-BE" smtClean="0"/>
-              <a:t>‹#›</a:t>
+              <a:t>‹nr.›</a:t>
             </a:fld>
             <a:endParaRPr lang="nl-BE"/>
           </a:p>
@@ -12734,7 +12734,6 @@
               <a:rPr lang="nl-NL" dirty="0" smtClean="0"/>
               <a:t>Slideshows</a:t>
             </a:r>
-            <a:endParaRPr lang="nl-NL" dirty="0" smtClean="0"/>
           </a:p>
           <a:p>
             <a:endParaRPr lang="nl-NL" dirty="0" smtClean="0"/>
@@ -14028,20 +14027,24 @@
           <a:lstStyle/>
           <a:p>
             <a:r>
+              <a:rPr lang="nl-NL" dirty="0" smtClean="0"/>
+              <a:t>The </a:t>
+            </a:r>
+            <a:r>
               <a:rPr lang="nl-NL" dirty="0" err="1" smtClean="0"/>
-              <a:t>What’s</a:t>
-            </a:r>
-            <a:r>
-              <a:rPr lang="nl-NL" dirty="0" smtClean="0"/>
-              <a:t> wrong </a:t>
-            </a:r>
-            <a:r>
-              <a:rPr lang="nl-NL" dirty="0" err="1" smtClean="0"/>
-              <a:t>with</a:t>
+              <a:t>good</a:t>
             </a:r>
             <a:r>
               <a:rPr lang="nl-NL" dirty="0" smtClean="0"/>
               <a:t> </a:t>
+            </a:r>
+            <a:r>
+              <a:rPr lang="nl-NL" dirty="0" err="1" smtClean="0"/>
+              <a:t>and</a:t>
+            </a:r>
+            <a:r>
+              <a:rPr lang="nl-NL" dirty="0" smtClean="0"/>
+              <a:t> bad: </a:t>
             </a:r>
             <a:r>
               <a:rPr lang="nl-NL" dirty="0" err="1" smtClean="0"/>
@@ -14061,11 +14064,20 @@
             <p:ph idx="1"/>
           </p:nvPr>
         </p:nvSpPr>
-        <p:spPr/>
+        <p:spPr>
+          <a:xfrm>
+            <a:off x="838200" y="1825625"/>
+            <a:ext cx="4772891" cy="4351338"/>
+          </a:xfrm>
+        </p:spPr>
         <p:txBody>
           <a:bodyPr/>
           <a:lstStyle/>
           <a:p>
+            <a:pPr>
+              <a:buFontTx/>
+              <a:buChar char="-"/>
+            </a:pPr>
             <a:r>
               <a:rPr lang="nl-NL" dirty="0" err="1" smtClean="0"/>
               <a:t>Not</a:t>
@@ -14081,9 +14093,17 @@
             <a:endParaRPr lang="nl-NL" dirty="0"/>
           </a:p>
           <a:p>
+            <a:pPr>
+              <a:buFontTx/>
+              <a:buChar char="-"/>
+            </a:pPr>
             <a:endParaRPr lang="nl-NL" dirty="0" smtClean="0"/>
           </a:p>
           <a:p>
+            <a:pPr>
+              <a:buFontTx/>
+              <a:buChar char="-"/>
+            </a:pPr>
             <a:r>
               <a:rPr lang="nl-NL" dirty="0" smtClean="0"/>
               <a:t>Too </a:t>
@@ -14106,9 +14126,17 @@
             </a:r>
           </a:p>
           <a:p>
+            <a:pPr>
+              <a:buFontTx/>
+              <a:buChar char="-"/>
+            </a:pPr>
             <a:endParaRPr lang="nl-NL" dirty="0"/>
           </a:p>
           <a:p>
+            <a:pPr>
+              <a:buFontTx/>
+              <a:buChar char="-"/>
+            </a:pPr>
             <a:r>
               <a:rPr lang="nl-NL" dirty="0" smtClean="0"/>
               <a:t>No </a:t>
@@ -14123,9 +14151,17 @@
             </a:r>
           </a:p>
           <a:p>
+            <a:pPr>
+              <a:buFont typeface="Calibri" panose="020F0502020204030204" pitchFamily="34" charset="0"/>
+              <a:buChar char="‒"/>
+            </a:pPr>
             <a:endParaRPr lang="nl-NL" dirty="0"/>
           </a:p>
           <a:p>
+            <a:pPr>
+              <a:buFont typeface="Calibri" panose="020F0502020204030204" pitchFamily="34" charset="0"/>
+              <a:buChar char="‒"/>
+            </a:pPr>
             <a:endParaRPr lang="nl-BE" dirty="0"/>
           </a:p>
         </p:txBody>
@@ -14179,6 +14215,279 @@
               <a:t>3</a:t>
             </a:fld>
             <a:endParaRPr lang="nl-BE"/>
+          </a:p>
+        </p:txBody>
+      </p:sp>
+      <p:sp>
+        <p:nvSpPr>
+          <p:cNvPr id="6" name="Content Placeholder 2"/>
+          <p:cNvSpPr txBox="1">
+            <a:spLocks/>
+          </p:cNvSpPr>
+          <p:nvPr/>
+        </p:nvSpPr>
+        <p:spPr>
+          <a:xfrm>
+            <a:off x="6580909" y="1825625"/>
+            <a:ext cx="4772891" cy="4351338"/>
+          </a:xfrm>
+          <a:prstGeom prst="rect">
+            <a:avLst/>
+          </a:prstGeom>
+        </p:spPr>
+        <p:txBody>
+          <a:bodyPr vert="horz" lIns="91440" tIns="45720" rIns="91440" bIns="45720" rtlCol="0">
+            <a:normAutofit/>
+          </a:bodyPr>
+          <a:lstStyle>
+            <a:lvl1pPr marL="228600" indent="-228600" algn="l" defTabSz="914400" rtl="0" eaLnBrk="1" latinLnBrk="0" hangingPunct="1">
+              <a:lnSpc>
+                <a:spcPct val="90000"/>
+              </a:lnSpc>
+              <a:spcBef>
+                <a:spcPts val="1000"/>
+              </a:spcBef>
+              <a:buFont typeface="Arial" panose="020B0604020202020204" pitchFamily="34" charset="0"/>
+              <a:buChar char="•"/>
+              <a:defRPr sz="2800" kern="1200">
+                <a:solidFill>
+                  <a:schemeClr val="tx1"/>
+                </a:solidFill>
+                <a:latin typeface="+mn-lt"/>
+                <a:ea typeface="+mn-ea"/>
+                <a:cs typeface="+mn-cs"/>
+              </a:defRPr>
+            </a:lvl1pPr>
+            <a:lvl2pPr marL="685800" indent="-228600" algn="l" defTabSz="914400" rtl="0" eaLnBrk="1" latinLnBrk="0" hangingPunct="1">
+              <a:lnSpc>
+                <a:spcPct val="90000"/>
+              </a:lnSpc>
+              <a:spcBef>
+                <a:spcPts val="500"/>
+              </a:spcBef>
+              <a:buFont typeface="Arial" panose="020B0604020202020204" pitchFamily="34" charset="0"/>
+              <a:buChar char="•"/>
+              <a:defRPr sz="2400" kern="1200">
+                <a:solidFill>
+                  <a:schemeClr val="tx1"/>
+                </a:solidFill>
+                <a:latin typeface="+mn-lt"/>
+                <a:ea typeface="+mn-ea"/>
+                <a:cs typeface="+mn-cs"/>
+              </a:defRPr>
+            </a:lvl2pPr>
+            <a:lvl3pPr marL="1143000" indent="-228600" algn="l" defTabSz="914400" rtl="0" eaLnBrk="1" latinLnBrk="0" hangingPunct="1">
+              <a:lnSpc>
+                <a:spcPct val="90000"/>
+              </a:lnSpc>
+              <a:spcBef>
+                <a:spcPts val="500"/>
+              </a:spcBef>
+              <a:buFont typeface="Arial" panose="020B0604020202020204" pitchFamily="34" charset="0"/>
+              <a:buChar char="•"/>
+              <a:defRPr sz="2000" kern="1200">
+                <a:solidFill>
+                  <a:schemeClr val="tx1"/>
+                </a:solidFill>
+                <a:latin typeface="+mn-lt"/>
+                <a:ea typeface="+mn-ea"/>
+                <a:cs typeface="+mn-cs"/>
+              </a:defRPr>
+            </a:lvl3pPr>
+            <a:lvl4pPr marL="1600200" indent="-228600" algn="l" defTabSz="914400" rtl="0" eaLnBrk="1" latinLnBrk="0" hangingPunct="1">
+              <a:lnSpc>
+                <a:spcPct val="90000"/>
+              </a:lnSpc>
+              <a:spcBef>
+                <a:spcPts val="500"/>
+              </a:spcBef>
+              <a:buFont typeface="Arial" panose="020B0604020202020204" pitchFamily="34" charset="0"/>
+              <a:buChar char="•"/>
+              <a:defRPr sz="1800" kern="1200">
+                <a:solidFill>
+                  <a:schemeClr val="tx1"/>
+                </a:solidFill>
+                <a:latin typeface="+mn-lt"/>
+                <a:ea typeface="+mn-ea"/>
+                <a:cs typeface="+mn-cs"/>
+              </a:defRPr>
+            </a:lvl4pPr>
+            <a:lvl5pPr marL="2057400" indent="-228600" algn="l" defTabSz="914400" rtl="0" eaLnBrk="1" latinLnBrk="0" hangingPunct="1">
+              <a:lnSpc>
+                <a:spcPct val="90000"/>
+              </a:lnSpc>
+              <a:spcBef>
+                <a:spcPts val="500"/>
+              </a:spcBef>
+              <a:buFont typeface="Arial" panose="020B0604020202020204" pitchFamily="34" charset="0"/>
+              <a:buChar char="•"/>
+              <a:defRPr sz="1800" kern="1200">
+                <a:solidFill>
+                  <a:schemeClr val="tx1"/>
+                </a:solidFill>
+                <a:latin typeface="+mn-lt"/>
+                <a:ea typeface="+mn-ea"/>
+                <a:cs typeface="+mn-cs"/>
+              </a:defRPr>
+            </a:lvl5pPr>
+            <a:lvl6pPr marL="2514600" indent="-228600" algn="l" defTabSz="914400" rtl="0" eaLnBrk="1" latinLnBrk="0" hangingPunct="1">
+              <a:lnSpc>
+                <a:spcPct val="90000"/>
+              </a:lnSpc>
+              <a:spcBef>
+                <a:spcPts val="500"/>
+              </a:spcBef>
+              <a:buFont typeface="Arial" panose="020B0604020202020204" pitchFamily="34" charset="0"/>
+              <a:buChar char="•"/>
+              <a:defRPr sz="1800" kern="1200">
+                <a:solidFill>
+                  <a:schemeClr val="tx1"/>
+                </a:solidFill>
+                <a:latin typeface="+mn-lt"/>
+                <a:ea typeface="+mn-ea"/>
+                <a:cs typeface="+mn-cs"/>
+              </a:defRPr>
+            </a:lvl6pPr>
+            <a:lvl7pPr marL="2971800" indent="-228600" algn="l" defTabSz="914400" rtl="0" eaLnBrk="1" latinLnBrk="0" hangingPunct="1">
+              <a:lnSpc>
+                <a:spcPct val="90000"/>
+              </a:lnSpc>
+              <a:spcBef>
+                <a:spcPts val="500"/>
+              </a:spcBef>
+              <a:buFont typeface="Arial" panose="020B0604020202020204" pitchFamily="34" charset="0"/>
+              <a:buChar char="•"/>
+              <a:defRPr sz="1800" kern="1200">
+                <a:solidFill>
+                  <a:schemeClr val="tx1"/>
+                </a:solidFill>
+                <a:latin typeface="+mn-lt"/>
+                <a:ea typeface="+mn-ea"/>
+                <a:cs typeface="+mn-cs"/>
+              </a:defRPr>
+            </a:lvl7pPr>
+            <a:lvl8pPr marL="3429000" indent="-228600" algn="l" defTabSz="914400" rtl="0" eaLnBrk="1" latinLnBrk="0" hangingPunct="1">
+              <a:lnSpc>
+                <a:spcPct val="90000"/>
+              </a:lnSpc>
+              <a:spcBef>
+                <a:spcPts val="500"/>
+              </a:spcBef>
+              <a:buFont typeface="Arial" panose="020B0604020202020204" pitchFamily="34" charset="0"/>
+              <a:buChar char="•"/>
+              <a:defRPr sz="1800" kern="1200">
+                <a:solidFill>
+                  <a:schemeClr val="tx1"/>
+                </a:solidFill>
+                <a:latin typeface="+mn-lt"/>
+                <a:ea typeface="+mn-ea"/>
+                <a:cs typeface="+mn-cs"/>
+              </a:defRPr>
+            </a:lvl8pPr>
+            <a:lvl9pPr marL="3886200" indent="-228600" algn="l" defTabSz="914400" rtl="0" eaLnBrk="1" latinLnBrk="0" hangingPunct="1">
+              <a:lnSpc>
+                <a:spcPct val="90000"/>
+              </a:lnSpc>
+              <a:spcBef>
+                <a:spcPts val="500"/>
+              </a:spcBef>
+              <a:buFont typeface="Arial" panose="020B0604020202020204" pitchFamily="34" charset="0"/>
+              <a:buChar char="•"/>
+              <a:defRPr sz="1800" kern="1200">
+                <a:solidFill>
+                  <a:schemeClr val="tx1"/>
+                </a:solidFill>
+                <a:latin typeface="+mn-lt"/>
+                <a:ea typeface="+mn-ea"/>
+                <a:cs typeface="+mn-cs"/>
+              </a:defRPr>
+            </a:lvl9pPr>
+          </a:lstStyle>
+          <a:p>
+            <a:pPr>
+              <a:buFontTx/>
+              <a:buChar char="+"/>
+            </a:pPr>
+            <a:r>
+              <a:rPr lang="nl-NL" dirty="0" smtClean="0"/>
+              <a:t>Easy </a:t>
+            </a:r>
+            <a:r>
+              <a:rPr lang="nl-NL" dirty="0" err="1" smtClean="0"/>
+              <a:t>to</a:t>
+            </a:r>
+            <a:r>
+              <a:rPr lang="nl-NL" dirty="0" smtClean="0"/>
+              <a:t> </a:t>
+            </a:r>
+            <a:r>
+              <a:rPr lang="nl-NL" dirty="0" err="1" smtClean="0"/>
+              <a:t>read</a:t>
+            </a:r>
+            <a:r>
+              <a:rPr lang="nl-NL" dirty="0" smtClean="0"/>
+              <a:t>/</a:t>
+            </a:r>
+            <a:r>
+              <a:rPr lang="nl-NL" dirty="0" err="1" smtClean="0"/>
+              <a:t>write</a:t>
+            </a:r>
+            <a:endParaRPr lang="nl-NL" dirty="0" smtClean="0"/>
+          </a:p>
+          <a:p>
+            <a:pPr>
+              <a:buFontTx/>
+              <a:buChar char="+"/>
+            </a:pPr>
+            <a:endParaRPr lang="nl-NL" dirty="0" smtClean="0"/>
+          </a:p>
+          <a:p>
+            <a:pPr>
+              <a:buFontTx/>
+              <a:buChar char="+"/>
+            </a:pPr>
+            <a:r>
+              <a:rPr lang="nl-NL" dirty="0" err="1" smtClean="0"/>
+              <a:t>Very</a:t>
+            </a:r>
+            <a:r>
+              <a:rPr lang="nl-NL" dirty="0" smtClean="0"/>
+              <a:t> easy </a:t>
+            </a:r>
+            <a:r>
+              <a:rPr lang="nl-NL" dirty="0" err="1" smtClean="0"/>
+              <a:t>to</a:t>
+            </a:r>
+            <a:r>
+              <a:rPr lang="nl-NL" dirty="0" smtClean="0"/>
+              <a:t> get </a:t>
+            </a:r>
+            <a:r>
+              <a:rPr lang="nl-NL" dirty="0" err="1" smtClean="0"/>
+              <a:t>started</a:t>
+            </a:r>
+            <a:endParaRPr lang="nl-NL" dirty="0" smtClean="0"/>
+          </a:p>
+          <a:p>
+            <a:pPr>
+              <a:buFontTx/>
+              <a:buChar char="+"/>
+            </a:pPr>
+            <a:endParaRPr lang="nl-NL" dirty="0" smtClean="0"/>
+          </a:p>
+          <a:p>
+            <a:pPr>
+              <a:buFontTx/>
+              <a:buChar char="+"/>
+            </a:pPr>
+            <a:endParaRPr lang="nl-NL" dirty="0" smtClean="0"/>
+          </a:p>
+          <a:p>
+            <a:pPr>
+              <a:buFontTx/>
+              <a:buChar char="+"/>
+            </a:pPr>
+            <a:endParaRPr lang="nl-BE" dirty="0"/>
           </a:p>
         </p:txBody>
       </p:sp>
@@ -14347,6 +14656,104 @@
                       </p:childTnLst>
                     </p:cTn>
                   </p:par>
+                  <p:par>
+                    <p:cTn id="15" fill="hold">
+                      <p:stCondLst>
+                        <p:cond delay="indefinite"/>
+                      </p:stCondLst>
+                      <p:childTnLst>
+                        <p:par>
+                          <p:cTn id="16" fill="hold">
+                            <p:stCondLst>
+                              <p:cond delay="0"/>
+                            </p:stCondLst>
+                            <p:childTnLst>
+                              <p:par>
+                                <p:cTn id="17" presetID="1" presetClass="entr" presetSubtype="0" fill="hold" grpId="0" nodeType="clickEffect">
+                                  <p:stCondLst>
+                                    <p:cond delay="0"/>
+                                  </p:stCondLst>
+                                  <p:childTnLst>
+                                    <p:set>
+                                      <p:cBhvr>
+                                        <p:cTn id="18" dur="1" fill="hold">
+                                          <p:stCondLst>
+                                            <p:cond delay="0"/>
+                                          </p:stCondLst>
+                                        </p:cTn>
+                                        <p:tgtEl>
+                                          <p:spTgt spid="6">
+                                            <p:txEl>
+                                              <p:pRg st="0" end="0"/>
+                                            </p:txEl>
+                                          </p:spTgt>
+                                        </p:tgtEl>
+                                        <p:attrNameLst>
+                                          <p:attrName>style.visibility</p:attrName>
+                                        </p:attrNameLst>
+                                      </p:cBhvr>
+                                      <p:to>
+                                        <p:strVal val="visible"/>
+                                      </p:to>
+                                    </p:set>
+                                  </p:childTnLst>
+                                </p:cTn>
+                              </p:par>
+                            </p:childTnLst>
+                          </p:cTn>
+                        </p:par>
+                      </p:childTnLst>
+                    </p:cTn>
+                  </p:par>
+                  <p:par>
+                    <p:cTn id="19" fill="hold">
+                      <p:stCondLst>
+                        <p:cond delay="indefinite"/>
+                      </p:stCondLst>
+                      <p:childTnLst>
+                        <p:par>
+                          <p:cTn id="20" fill="hold">
+                            <p:stCondLst>
+                              <p:cond delay="0"/>
+                            </p:stCondLst>
+                            <p:childTnLst>
+                              <p:par>
+                                <p:cTn id="21" presetID="1" presetClass="entr" presetSubtype="0" fill="hold" grpId="0" nodeType="clickEffect">
+                                  <p:stCondLst>
+                                    <p:cond delay="0"/>
+                                  </p:stCondLst>
+                                  <p:childTnLst>
+                                    <p:set>
+                                      <p:cBhvr>
+                                        <p:cTn id="22" dur="1" fill="hold">
+                                          <p:stCondLst>
+                                            <p:cond delay="0"/>
+                                          </p:stCondLst>
+                                        </p:cTn>
+                                        <p:tgtEl>
+                                          <p:spTgt spid="6">
+                                            <p:txEl>
+                                              <p:pRg st="2" end="2"/>
+                                            </p:txEl>
+                                          </p:spTgt>
+                                        </p:tgtEl>
+                                        <p:attrNameLst>
+                                          <p:attrName>style.visibility</p:attrName>
+                                        </p:attrNameLst>
+                                      </p:cBhvr>
+                                      <p:to>
+                                        <p:strVal val="visible"/>
+                                      </p:to>
+                                    </p:set>
+                                  </p:childTnLst>
+                                </p:cTn>
+                              </p:par>
+                            </p:childTnLst>
+                          </p:cTn>
+                        </p:par>
+                      </p:childTnLst>
+                    </p:cTn>
+                  </p:par>
                 </p:childTnLst>
               </p:cTn>
               <p:prevCondLst>
@@ -14370,6 +14777,7 @@
     </p:tnLst>
     <p:bldLst>
       <p:bldP spid="3" grpId="0" build="p"/>
+      <p:bldP spid="6" grpId="0" build="p"/>
     </p:bldLst>
   </p:timing>
 </p:sld>
@@ -14408,23 +14816,27 @@
           <a:lstStyle/>
           <a:p>
             <a:r>
-              <a:rPr lang="nl-NL" dirty="0" err="1" smtClean="0"/>
-              <a:t>What’s</a:t>
-            </a:r>
-            <a:r>
-              <a:rPr lang="nl-NL" dirty="0" smtClean="0"/>
-              <a:t> wrong </a:t>
-            </a:r>
-            <a:r>
-              <a:rPr lang="nl-NL" dirty="0" err="1" smtClean="0"/>
-              <a:t>with</a:t>
-            </a:r>
-            <a:r>
-              <a:rPr lang="nl-NL" dirty="0" smtClean="0"/>
+              <a:rPr lang="nl-NL" dirty="0"/>
+              <a:t>The </a:t>
+            </a:r>
+            <a:r>
+              <a:rPr lang="nl-NL" dirty="0" err="1"/>
+              <a:t>good</a:t>
+            </a:r>
+            <a:r>
+              <a:rPr lang="nl-NL" dirty="0"/>
               <a:t> </a:t>
             </a:r>
             <a:r>
-              <a:rPr lang="nl-NL" dirty="0" err="1" smtClean="0"/>
+              <a:rPr lang="nl-NL" dirty="0" err="1"/>
+              <a:t>and</a:t>
+            </a:r>
+            <a:r>
+              <a:rPr lang="nl-NL" dirty="0"/>
+              <a:t> bad: </a:t>
+            </a:r>
+            <a:r>
+              <a:rPr lang="nl-NL" dirty="0" err="1"/>
               <a:t>TeX</a:t>
             </a:r>
             <a:endParaRPr lang="nl-BE" dirty="0"/>
@@ -14441,11 +14853,20 @@
             <p:ph idx="1"/>
           </p:nvPr>
         </p:nvSpPr>
-        <p:spPr/>
+        <p:spPr>
+          <a:xfrm>
+            <a:off x="838200" y="1825625"/>
+            <a:ext cx="5742709" cy="4351338"/>
+          </a:xfrm>
+        </p:spPr>
         <p:txBody>
           <a:bodyPr/>
           <a:lstStyle/>
           <a:p>
+            <a:pPr>
+              <a:buFont typeface="Calibri" panose="020F0502020204030204" pitchFamily="34" charset="0"/>
+              <a:buChar char="-"/>
+            </a:pPr>
             <a:r>
               <a:rPr lang="nl-NL" dirty="0" err="1" smtClean="0"/>
               <a:t>Steep</a:t>
@@ -14472,9 +14893,17 @@
             </a:r>
           </a:p>
           <a:p>
+            <a:pPr>
+              <a:buFont typeface="Calibri" panose="020F0502020204030204" pitchFamily="34" charset="0"/>
+              <a:buChar char="-"/>
+            </a:pPr>
             <a:endParaRPr lang="nl-NL" dirty="0"/>
           </a:p>
           <a:p>
+            <a:pPr>
+              <a:buFont typeface="Calibri" panose="020F0502020204030204" pitchFamily="34" charset="0"/>
+              <a:buChar char="-"/>
+            </a:pPr>
             <a:r>
               <a:rPr lang="nl-NL" dirty="0" err="1" smtClean="0"/>
               <a:t>Allows</a:t>
@@ -14498,9 +14927,17 @@
             <a:endParaRPr lang="nl-NL" dirty="0"/>
           </a:p>
           <a:p>
+            <a:pPr>
+              <a:buFont typeface="Calibri" panose="020F0502020204030204" pitchFamily="34" charset="0"/>
+              <a:buChar char="-"/>
+            </a:pPr>
             <a:endParaRPr lang="nl-NL" dirty="0" smtClean="0"/>
           </a:p>
           <a:p>
+            <a:pPr>
+              <a:buFont typeface="Calibri" panose="020F0502020204030204" pitchFamily="34" charset="0"/>
+              <a:buChar char="-"/>
+            </a:pPr>
             <a:r>
               <a:rPr lang="nl-NL" dirty="0" err="1" smtClean="0"/>
               <a:t>Overly</a:t>
@@ -14511,9 +14948,17 @@
             </a:r>
           </a:p>
           <a:p>
+            <a:pPr>
+              <a:buFont typeface="Calibri" panose="020F0502020204030204" pitchFamily="34" charset="0"/>
+              <a:buChar char="-"/>
+            </a:pPr>
             <a:endParaRPr lang="nl-NL" dirty="0"/>
           </a:p>
           <a:p>
+            <a:pPr>
+              <a:buFont typeface="Calibri" panose="020F0502020204030204" pitchFamily="34" charset="0"/>
+              <a:buChar char="-"/>
+            </a:pPr>
             <a:r>
               <a:rPr lang="nl-NL" dirty="0" err="1" smtClean="0"/>
               <a:t>Not</a:t>
@@ -14587,6 +15032,291 @@
               <a:t>4</a:t>
             </a:fld>
             <a:endParaRPr lang="nl-BE"/>
+          </a:p>
+        </p:txBody>
+      </p:sp>
+      <p:sp>
+        <p:nvSpPr>
+          <p:cNvPr id="7" name="Content Placeholder 2"/>
+          <p:cNvSpPr txBox="1">
+            <a:spLocks/>
+          </p:cNvSpPr>
+          <p:nvPr/>
+        </p:nvSpPr>
+        <p:spPr>
+          <a:xfrm>
+            <a:off x="6580909" y="1825625"/>
+            <a:ext cx="4772891" cy="4351338"/>
+          </a:xfrm>
+          <a:prstGeom prst="rect">
+            <a:avLst/>
+          </a:prstGeom>
+        </p:spPr>
+        <p:txBody>
+          <a:bodyPr vert="horz" lIns="91440" tIns="45720" rIns="91440" bIns="45720" rtlCol="0">
+            <a:normAutofit/>
+          </a:bodyPr>
+          <a:lstStyle>
+            <a:lvl1pPr marL="228600" indent="-228600" algn="l" defTabSz="914400" rtl="0" eaLnBrk="1" latinLnBrk="0" hangingPunct="1">
+              <a:lnSpc>
+                <a:spcPct val="90000"/>
+              </a:lnSpc>
+              <a:spcBef>
+                <a:spcPts val="1000"/>
+              </a:spcBef>
+              <a:buFont typeface="Arial" panose="020B0604020202020204" pitchFamily="34" charset="0"/>
+              <a:buChar char="•"/>
+              <a:defRPr sz="2800" kern="1200">
+                <a:solidFill>
+                  <a:schemeClr val="tx1"/>
+                </a:solidFill>
+                <a:latin typeface="+mn-lt"/>
+                <a:ea typeface="+mn-ea"/>
+                <a:cs typeface="+mn-cs"/>
+              </a:defRPr>
+            </a:lvl1pPr>
+            <a:lvl2pPr marL="685800" indent="-228600" algn="l" defTabSz="914400" rtl="0" eaLnBrk="1" latinLnBrk="0" hangingPunct="1">
+              <a:lnSpc>
+                <a:spcPct val="90000"/>
+              </a:lnSpc>
+              <a:spcBef>
+                <a:spcPts val="500"/>
+              </a:spcBef>
+              <a:buFont typeface="Arial" panose="020B0604020202020204" pitchFamily="34" charset="0"/>
+              <a:buChar char="•"/>
+              <a:defRPr sz="2400" kern="1200">
+                <a:solidFill>
+                  <a:schemeClr val="tx1"/>
+                </a:solidFill>
+                <a:latin typeface="+mn-lt"/>
+                <a:ea typeface="+mn-ea"/>
+                <a:cs typeface="+mn-cs"/>
+              </a:defRPr>
+            </a:lvl2pPr>
+            <a:lvl3pPr marL="1143000" indent="-228600" algn="l" defTabSz="914400" rtl="0" eaLnBrk="1" latinLnBrk="0" hangingPunct="1">
+              <a:lnSpc>
+                <a:spcPct val="90000"/>
+              </a:lnSpc>
+              <a:spcBef>
+                <a:spcPts val="500"/>
+              </a:spcBef>
+              <a:buFont typeface="Arial" panose="020B0604020202020204" pitchFamily="34" charset="0"/>
+              <a:buChar char="•"/>
+              <a:defRPr sz="2000" kern="1200">
+                <a:solidFill>
+                  <a:schemeClr val="tx1"/>
+                </a:solidFill>
+                <a:latin typeface="+mn-lt"/>
+                <a:ea typeface="+mn-ea"/>
+                <a:cs typeface="+mn-cs"/>
+              </a:defRPr>
+            </a:lvl3pPr>
+            <a:lvl4pPr marL="1600200" indent="-228600" algn="l" defTabSz="914400" rtl="0" eaLnBrk="1" latinLnBrk="0" hangingPunct="1">
+              <a:lnSpc>
+                <a:spcPct val="90000"/>
+              </a:lnSpc>
+              <a:spcBef>
+                <a:spcPts val="500"/>
+              </a:spcBef>
+              <a:buFont typeface="Arial" panose="020B0604020202020204" pitchFamily="34" charset="0"/>
+              <a:buChar char="•"/>
+              <a:defRPr sz="1800" kern="1200">
+                <a:solidFill>
+                  <a:schemeClr val="tx1"/>
+                </a:solidFill>
+                <a:latin typeface="+mn-lt"/>
+                <a:ea typeface="+mn-ea"/>
+                <a:cs typeface="+mn-cs"/>
+              </a:defRPr>
+            </a:lvl4pPr>
+            <a:lvl5pPr marL="2057400" indent="-228600" algn="l" defTabSz="914400" rtl="0" eaLnBrk="1" latinLnBrk="0" hangingPunct="1">
+              <a:lnSpc>
+                <a:spcPct val="90000"/>
+              </a:lnSpc>
+              <a:spcBef>
+                <a:spcPts val="500"/>
+              </a:spcBef>
+              <a:buFont typeface="Arial" panose="020B0604020202020204" pitchFamily="34" charset="0"/>
+              <a:buChar char="•"/>
+              <a:defRPr sz="1800" kern="1200">
+                <a:solidFill>
+                  <a:schemeClr val="tx1"/>
+                </a:solidFill>
+                <a:latin typeface="+mn-lt"/>
+                <a:ea typeface="+mn-ea"/>
+                <a:cs typeface="+mn-cs"/>
+              </a:defRPr>
+            </a:lvl5pPr>
+            <a:lvl6pPr marL="2514600" indent="-228600" algn="l" defTabSz="914400" rtl="0" eaLnBrk="1" latinLnBrk="0" hangingPunct="1">
+              <a:lnSpc>
+                <a:spcPct val="90000"/>
+              </a:lnSpc>
+              <a:spcBef>
+                <a:spcPts val="500"/>
+              </a:spcBef>
+              <a:buFont typeface="Arial" panose="020B0604020202020204" pitchFamily="34" charset="0"/>
+              <a:buChar char="•"/>
+              <a:defRPr sz="1800" kern="1200">
+                <a:solidFill>
+                  <a:schemeClr val="tx1"/>
+                </a:solidFill>
+                <a:latin typeface="+mn-lt"/>
+                <a:ea typeface="+mn-ea"/>
+                <a:cs typeface="+mn-cs"/>
+              </a:defRPr>
+            </a:lvl6pPr>
+            <a:lvl7pPr marL="2971800" indent="-228600" algn="l" defTabSz="914400" rtl="0" eaLnBrk="1" latinLnBrk="0" hangingPunct="1">
+              <a:lnSpc>
+                <a:spcPct val="90000"/>
+              </a:lnSpc>
+              <a:spcBef>
+                <a:spcPts val="500"/>
+              </a:spcBef>
+              <a:buFont typeface="Arial" panose="020B0604020202020204" pitchFamily="34" charset="0"/>
+              <a:buChar char="•"/>
+              <a:defRPr sz="1800" kern="1200">
+                <a:solidFill>
+                  <a:schemeClr val="tx1"/>
+                </a:solidFill>
+                <a:latin typeface="+mn-lt"/>
+                <a:ea typeface="+mn-ea"/>
+                <a:cs typeface="+mn-cs"/>
+              </a:defRPr>
+            </a:lvl7pPr>
+            <a:lvl8pPr marL="3429000" indent="-228600" algn="l" defTabSz="914400" rtl="0" eaLnBrk="1" latinLnBrk="0" hangingPunct="1">
+              <a:lnSpc>
+                <a:spcPct val="90000"/>
+              </a:lnSpc>
+              <a:spcBef>
+                <a:spcPts val="500"/>
+              </a:spcBef>
+              <a:buFont typeface="Arial" panose="020B0604020202020204" pitchFamily="34" charset="0"/>
+              <a:buChar char="•"/>
+              <a:defRPr sz="1800" kern="1200">
+                <a:solidFill>
+                  <a:schemeClr val="tx1"/>
+                </a:solidFill>
+                <a:latin typeface="+mn-lt"/>
+                <a:ea typeface="+mn-ea"/>
+                <a:cs typeface="+mn-cs"/>
+              </a:defRPr>
+            </a:lvl8pPr>
+            <a:lvl9pPr marL="3886200" indent="-228600" algn="l" defTabSz="914400" rtl="0" eaLnBrk="1" latinLnBrk="0" hangingPunct="1">
+              <a:lnSpc>
+                <a:spcPct val="90000"/>
+              </a:lnSpc>
+              <a:spcBef>
+                <a:spcPts val="500"/>
+              </a:spcBef>
+              <a:buFont typeface="Arial" panose="020B0604020202020204" pitchFamily="34" charset="0"/>
+              <a:buChar char="•"/>
+              <a:defRPr sz="1800" kern="1200">
+                <a:solidFill>
+                  <a:schemeClr val="tx1"/>
+                </a:solidFill>
+                <a:latin typeface="+mn-lt"/>
+                <a:ea typeface="+mn-ea"/>
+                <a:cs typeface="+mn-cs"/>
+              </a:defRPr>
+            </a:lvl9pPr>
+          </a:lstStyle>
+          <a:p>
+            <a:pPr>
+              <a:buFontTx/>
+              <a:buChar char="+"/>
+            </a:pPr>
+            <a:r>
+              <a:rPr lang="nl-NL" dirty="0" smtClean="0"/>
+              <a:t>Well </a:t>
+            </a:r>
+            <a:r>
+              <a:rPr lang="nl-NL" dirty="0" err="1"/>
+              <a:t>s</a:t>
+            </a:r>
+            <a:r>
+              <a:rPr lang="nl-NL" dirty="0" err="1" smtClean="0"/>
+              <a:t>uited</a:t>
+            </a:r>
+            <a:r>
+              <a:rPr lang="nl-NL" dirty="0" smtClean="0"/>
+              <a:t> </a:t>
+            </a:r>
+            <a:r>
+              <a:rPr lang="nl-NL" dirty="0" err="1" smtClean="0"/>
+              <a:t>for</a:t>
+            </a:r>
+            <a:r>
+              <a:rPr lang="nl-NL" dirty="0" smtClean="0"/>
+              <a:t> complex </a:t>
+            </a:r>
+            <a:r>
+              <a:rPr lang="nl-NL" dirty="0" err="1" smtClean="0"/>
+              <a:t>documents</a:t>
+            </a:r>
+            <a:endParaRPr lang="nl-NL" dirty="0" smtClean="0"/>
+          </a:p>
+          <a:p>
+            <a:pPr>
+              <a:buFontTx/>
+              <a:buChar char="+"/>
+            </a:pPr>
+            <a:endParaRPr lang="nl-NL" dirty="0"/>
+          </a:p>
+          <a:p>
+            <a:pPr>
+              <a:buFontTx/>
+              <a:buChar char="+"/>
+            </a:pPr>
+            <a:r>
+              <a:rPr lang="nl-NL" dirty="0" smtClean="0"/>
+              <a:t>Has a </a:t>
+            </a:r>
+            <a:r>
+              <a:rPr lang="nl-NL" dirty="0" err="1" smtClean="0"/>
+              <a:t>programing</a:t>
+            </a:r>
+            <a:r>
+              <a:rPr lang="nl-NL" dirty="0" smtClean="0"/>
+              <a:t> model</a:t>
+            </a:r>
+          </a:p>
+          <a:p>
+            <a:pPr>
+              <a:buFontTx/>
+              <a:buChar char="+"/>
+            </a:pPr>
+            <a:endParaRPr lang="nl-NL" dirty="0" smtClean="0"/>
+          </a:p>
+          <a:p>
+            <a:pPr>
+              <a:buFontTx/>
+              <a:buChar char="+"/>
+            </a:pPr>
+            <a:r>
+              <a:rPr lang="nl-NL" dirty="0" smtClean="0"/>
+              <a:t>Lots of packages</a:t>
+            </a:r>
+          </a:p>
+          <a:p>
+            <a:pPr>
+              <a:buFontTx/>
+              <a:buChar char="+"/>
+            </a:pPr>
+            <a:endParaRPr lang="nl-NL" dirty="0" smtClean="0"/>
+          </a:p>
+          <a:p>
+            <a:pPr>
+              <a:buFontTx/>
+              <a:buChar char="+"/>
+            </a:pPr>
+            <a:endParaRPr lang="nl-NL" dirty="0" smtClean="0"/>
+          </a:p>
+          <a:p>
+            <a:pPr>
+              <a:buFontTx/>
+              <a:buChar char="+"/>
+            </a:pPr>
+            <a:endParaRPr lang="nl-BE" dirty="0"/>
           </a:p>
         </p:txBody>
       </p:sp>
@@ -14804,6 +15534,153 @@
                       </p:childTnLst>
                     </p:cTn>
                   </p:par>
+                  <p:par>
+                    <p:cTn id="19" fill="hold">
+                      <p:stCondLst>
+                        <p:cond delay="indefinite"/>
+                      </p:stCondLst>
+                      <p:childTnLst>
+                        <p:par>
+                          <p:cTn id="20" fill="hold">
+                            <p:stCondLst>
+                              <p:cond delay="0"/>
+                            </p:stCondLst>
+                            <p:childTnLst>
+                              <p:par>
+                                <p:cTn id="21" presetID="1" presetClass="entr" presetSubtype="0" fill="hold" grpId="0" nodeType="clickEffect">
+                                  <p:stCondLst>
+                                    <p:cond delay="0"/>
+                                  </p:stCondLst>
+                                  <p:childTnLst>
+                                    <p:set>
+                                      <p:cBhvr>
+                                        <p:cTn id="22" dur="1" fill="hold">
+                                          <p:stCondLst>
+                                            <p:cond delay="0"/>
+                                          </p:stCondLst>
+                                        </p:cTn>
+                                        <p:tgtEl>
+                                          <p:spTgt spid="7">
+                                            <p:txEl>
+                                              <p:pRg st="0" end="0"/>
+                                            </p:txEl>
+                                          </p:spTgt>
+                                        </p:tgtEl>
+                                        <p:attrNameLst>
+                                          <p:attrName>style.visibility</p:attrName>
+                                        </p:attrNameLst>
+                                      </p:cBhvr>
+                                      <p:to>
+                                        <p:strVal val="visible"/>
+                                      </p:to>
+                                    </p:set>
+                                  </p:childTnLst>
+                                </p:cTn>
+                              </p:par>
+                            </p:childTnLst>
+                          </p:cTn>
+                        </p:par>
+                      </p:childTnLst>
+                    </p:cTn>
+                  </p:par>
+                  <p:par>
+                    <p:cTn id="23" fill="hold">
+                      <p:stCondLst>
+                        <p:cond delay="indefinite"/>
+                      </p:stCondLst>
+                      <p:childTnLst>
+                        <p:par>
+                          <p:cTn id="24" fill="hold">
+                            <p:stCondLst>
+                              <p:cond delay="0"/>
+                            </p:stCondLst>
+                            <p:childTnLst>
+                              <p:par>
+                                <p:cTn id="25" presetID="1" presetClass="entr" presetSubtype="0" fill="hold" grpId="0" nodeType="clickEffect">
+                                  <p:stCondLst>
+                                    <p:cond delay="0"/>
+                                  </p:stCondLst>
+                                  <p:childTnLst>
+                                    <p:set>
+                                      <p:cBhvr>
+                                        <p:cTn id="26" dur="1" fill="hold">
+                                          <p:stCondLst>
+                                            <p:cond delay="0"/>
+                                          </p:stCondLst>
+                                        </p:cTn>
+                                        <p:tgtEl>
+                                          <p:spTgt spid="7">
+                                            <p:txEl>
+                                              <p:pRg st="2" end="2"/>
+                                            </p:txEl>
+                                          </p:spTgt>
+                                        </p:tgtEl>
+                                        <p:attrNameLst>
+                                          <p:attrName>style.visibility</p:attrName>
+                                        </p:attrNameLst>
+                                      </p:cBhvr>
+                                      <p:to>
+                                        <p:strVal val="visible"/>
+                                      </p:to>
+                                    </p:set>
+                                  </p:childTnLst>
+                                </p:cTn>
+                              </p:par>
+                            </p:childTnLst>
+                          </p:cTn>
+                        </p:par>
+                      </p:childTnLst>
+                    </p:cTn>
+                  </p:par>
+                  <p:par>
+                    <p:cTn id="27" fill="hold">
+                      <p:stCondLst>
+                        <p:cond delay="indefinite"/>
+                      </p:stCondLst>
+                      <p:childTnLst>
+                        <p:par>
+                          <p:cTn id="28" fill="hold">
+                            <p:stCondLst>
+                              <p:cond delay="0"/>
+                            </p:stCondLst>
+                            <p:childTnLst>
+                              <p:par>
+                                <p:cTn id="29" presetID="1" presetClass="entr" presetSubtype="0" fill="hold" grpId="0" nodeType="clickEffect">
+                                  <p:stCondLst>
+                                    <p:cond delay="0"/>
+                                  </p:stCondLst>
+                                  <p:childTnLst>
+                                    <p:set>
+                                      <p:cBhvr>
+                                        <p:cTn id="30" dur="1" fill="hold">
+                                          <p:stCondLst>
+                                            <p:cond delay="0"/>
+                                          </p:stCondLst>
+                                        </p:cTn>
+                                        <p:tgtEl>
+                                          <p:spTgt spid="7">
+                                            <p:txEl>
+                                              <p:pRg st="4" end="4"/>
+                                            </p:txEl>
+                                          </p:spTgt>
+                                        </p:tgtEl>
+                                        <p:attrNameLst>
+                                          <p:attrName>style.visibility</p:attrName>
+                                        </p:attrNameLst>
+                                      </p:cBhvr>
+                                      <p:to>
+                                        <p:strVal val="visible"/>
+                                      </p:to>
+                                    </p:set>
+                                  </p:childTnLst>
+                                </p:cTn>
+                              </p:par>
+                            </p:childTnLst>
+                          </p:cTn>
+                        </p:par>
+                      </p:childTnLst>
+                    </p:cTn>
+                  </p:par>
                 </p:childTnLst>
               </p:cTn>
               <p:prevCondLst>
@@ -14827,6 +15704,7 @@
     </p:tnLst>
     <p:bldLst>
       <p:bldP spid="3" grpId="0" build="p"/>
+      <p:bldP spid="7" grpId="0" build="p"/>
     </p:bldLst>
   </p:timing>
 </p:sld>
@@ -14865,20 +15743,24 @@
           <a:lstStyle/>
           <a:p>
             <a:r>
-              <a:rPr lang="nl-NL" dirty="0" err="1" smtClean="0"/>
-              <a:t>What’s</a:t>
-            </a:r>
-            <a:r>
-              <a:rPr lang="nl-NL" dirty="0" smtClean="0"/>
-              <a:t> wrong </a:t>
-            </a:r>
-            <a:r>
-              <a:rPr lang="nl-NL" dirty="0" err="1" smtClean="0"/>
-              <a:t>with</a:t>
-            </a:r>
-            <a:r>
-              <a:rPr lang="nl-NL" dirty="0" smtClean="0"/>
-              <a:t> Word</a:t>
+              <a:rPr lang="nl-NL" dirty="0"/>
+              <a:t>The </a:t>
+            </a:r>
+            <a:r>
+              <a:rPr lang="nl-NL" dirty="0" err="1"/>
+              <a:t>good</a:t>
+            </a:r>
+            <a:r>
+              <a:rPr lang="nl-NL" dirty="0"/>
+              <a:t> </a:t>
+            </a:r>
+            <a:r>
+              <a:rPr lang="nl-NL" dirty="0" err="1"/>
+              <a:t>and</a:t>
+            </a:r>
+            <a:r>
+              <a:rPr lang="nl-NL" dirty="0"/>
+              <a:t> bad: Word</a:t>
             </a:r>
             <a:endParaRPr lang="nl-BE" dirty="0"/>
           </a:p>
@@ -14894,11 +15776,20 @@
             <p:ph idx="1"/>
           </p:nvPr>
         </p:nvSpPr>
-        <p:spPr/>
+        <p:spPr>
+          <a:xfrm>
+            <a:off x="838200" y="1825625"/>
+            <a:ext cx="5742709" cy="4351338"/>
+          </a:xfrm>
+        </p:spPr>
         <p:txBody>
           <a:bodyPr/>
           <a:lstStyle/>
           <a:p>
+            <a:pPr>
+              <a:buFont typeface="Calibri" panose="020F0502020204030204" pitchFamily="34" charset="0"/>
+              <a:buChar char="-"/>
+            </a:pPr>
             <a:r>
               <a:rPr lang="nl-NL" dirty="0" err="1" smtClean="0"/>
               <a:t>Corruptable</a:t>
@@ -14909,9 +15800,17 @@
             </a:r>
           </a:p>
           <a:p>
+            <a:pPr>
+              <a:buFont typeface="Calibri" panose="020F0502020204030204" pitchFamily="34" charset="0"/>
+              <a:buChar char="-"/>
+            </a:pPr>
             <a:endParaRPr lang="nl-NL" dirty="0"/>
           </a:p>
           <a:p>
+            <a:pPr>
+              <a:buFont typeface="Calibri" panose="020F0502020204030204" pitchFamily="34" charset="0"/>
+              <a:buChar char="-"/>
+            </a:pPr>
             <a:r>
               <a:rPr lang="nl-NL" dirty="0" err="1" smtClean="0"/>
               <a:t>Not</a:t>
@@ -14922,9 +15821,17 @@
             </a:r>
           </a:p>
           <a:p>
+            <a:pPr>
+              <a:buFont typeface="Calibri" panose="020F0502020204030204" pitchFamily="34" charset="0"/>
+              <a:buChar char="-"/>
+            </a:pPr>
             <a:endParaRPr lang="nl-NL" dirty="0"/>
           </a:p>
           <a:p>
+            <a:pPr>
+              <a:buFont typeface="Calibri" panose="020F0502020204030204" pitchFamily="34" charset="0"/>
+              <a:buChar char="-"/>
+            </a:pPr>
             <a:r>
               <a:rPr lang="nl-NL" dirty="0" smtClean="0"/>
               <a:t>Overkill </a:t>
@@ -14960,9 +15867,17 @@
             <a:endParaRPr lang="nl-NL" dirty="0" smtClean="0"/>
           </a:p>
           <a:p>
+            <a:pPr>
+              <a:buFont typeface="Calibri" panose="020F0502020204030204" pitchFamily="34" charset="0"/>
+              <a:buChar char="-"/>
+            </a:pPr>
             <a:endParaRPr lang="nl-NL" dirty="0"/>
           </a:p>
           <a:p>
+            <a:pPr>
+              <a:buFont typeface="Calibri" panose="020F0502020204030204" pitchFamily="34" charset="0"/>
+              <a:buChar char="-"/>
+            </a:pPr>
             <a:r>
               <a:rPr lang="nl-NL" dirty="0" err="1" smtClean="0"/>
               <a:t>Not</a:t>
@@ -15052,6 +15967,279 @@
               <a:t>5</a:t>
             </a:fld>
             <a:endParaRPr lang="nl-BE"/>
+          </a:p>
+        </p:txBody>
+      </p:sp>
+      <p:sp>
+        <p:nvSpPr>
+          <p:cNvPr id="7" name="Content Placeholder 2"/>
+          <p:cNvSpPr txBox="1">
+            <a:spLocks/>
+          </p:cNvSpPr>
+          <p:nvPr/>
+        </p:nvSpPr>
+        <p:spPr>
+          <a:xfrm>
+            <a:off x="6580909" y="1825625"/>
+            <a:ext cx="4772891" cy="4351338"/>
+          </a:xfrm>
+          <a:prstGeom prst="rect">
+            <a:avLst/>
+          </a:prstGeom>
+        </p:spPr>
+        <p:txBody>
+          <a:bodyPr vert="horz" lIns="91440" tIns="45720" rIns="91440" bIns="45720" rtlCol="0">
+            <a:normAutofit/>
+          </a:bodyPr>
+          <a:lstStyle>
+            <a:lvl1pPr marL="228600" indent="-228600" algn="l" defTabSz="914400" rtl="0" eaLnBrk="1" latinLnBrk="0" hangingPunct="1">
+              <a:lnSpc>
+                <a:spcPct val="90000"/>
+              </a:lnSpc>
+              <a:spcBef>
+                <a:spcPts val="1000"/>
+              </a:spcBef>
+              <a:buFont typeface="Arial" panose="020B0604020202020204" pitchFamily="34" charset="0"/>
+              <a:buChar char="•"/>
+              <a:defRPr sz="2800" kern="1200">
+                <a:solidFill>
+                  <a:schemeClr val="tx1"/>
+                </a:solidFill>
+                <a:latin typeface="+mn-lt"/>
+                <a:ea typeface="+mn-ea"/>
+                <a:cs typeface="+mn-cs"/>
+              </a:defRPr>
+            </a:lvl1pPr>
+            <a:lvl2pPr marL="685800" indent="-228600" algn="l" defTabSz="914400" rtl="0" eaLnBrk="1" latinLnBrk="0" hangingPunct="1">
+              <a:lnSpc>
+                <a:spcPct val="90000"/>
+              </a:lnSpc>
+              <a:spcBef>
+                <a:spcPts val="500"/>
+              </a:spcBef>
+              <a:buFont typeface="Arial" panose="020B0604020202020204" pitchFamily="34" charset="0"/>
+              <a:buChar char="•"/>
+              <a:defRPr sz="2400" kern="1200">
+                <a:solidFill>
+                  <a:schemeClr val="tx1"/>
+                </a:solidFill>
+                <a:latin typeface="+mn-lt"/>
+                <a:ea typeface="+mn-ea"/>
+                <a:cs typeface="+mn-cs"/>
+              </a:defRPr>
+            </a:lvl2pPr>
+            <a:lvl3pPr marL="1143000" indent="-228600" algn="l" defTabSz="914400" rtl="0" eaLnBrk="1" latinLnBrk="0" hangingPunct="1">
+              <a:lnSpc>
+                <a:spcPct val="90000"/>
+              </a:lnSpc>
+              <a:spcBef>
+                <a:spcPts val="500"/>
+              </a:spcBef>
+              <a:buFont typeface="Arial" panose="020B0604020202020204" pitchFamily="34" charset="0"/>
+              <a:buChar char="•"/>
+              <a:defRPr sz="2000" kern="1200">
+                <a:solidFill>
+                  <a:schemeClr val="tx1"/>
+                </a:solidFill>
+                <a:latin typeface="+mn-lt"/>
+                <a:ea typeface="+mn-ea"/>
+                <a:cs typeface="+mn-cs"/>
+              </a:defRPr>
+            </a:lvl3pPr>
+            <a:lvl4pPr marL="1600200" indent="-228600" algn="l" defTabSz="914400" rtl="0" eaLnBrk="1" latinLnBrk="0" hangingPunct="1">
+              <a:lnSpc>
+                <a:spcPct val="90000"/>
+              </a:lnSpc>
+              <a:spcBef>
+                <a:spcPts val="500"/>
+              </a:spcBef>
+              <a:buFont typeface="Arial" panose="020B0604020202020204" pitchFamily="34" charset="0"/>
+              <a:buChar char="•"/>
+              <a:defRPr sz="1800" kern="1200">
+                <a:solidFill>
+                  <a:schemeClr val="tx1"/>
+                </a:solidFill>
+                <a:latin typeface="+mn-lt"/>
+                <a:ea typeface="+mn-ea"/>
+                <a:cs typeface="+mn-cs"/>
+              </a:defRPr>
+            </a:lvl4pPr>
+            <a:lvl5pPr marL="2057400" indent="-228600" algn="l" defTabSz="914400" rtl="0" eaLnBrk="1" latinLnBrk="0" hangingPunct="1">
+              <a:lnSpc>
+                <a:spcPct val="90000"/>
+              </a:lnSpc>
+              <a:spcBef>
+                <a:spcPts val="500"/>
+              </a:spcBef>
+              <a:buFont typeface="Arial" panose="020B0604020202020204" pitchFamily="34" charset="0"/>
+              <a:buChar char="•"/>
+              <a:defRPr sz="1800" kern="1200">
+                <a:solidFill>
+                  <a:schemeClr val="tx1"/>
+                </a:solidFill>
+                <a:latin typeface="+mn-lt"/>
+                <a:ea typeface="+mn-ea"/>
+                <a:cs typeface="+mn-cs"/>
+              </a:defRPr>
+            </a:lvl5pPr>
+            <a:lvl6pPr marL="2514600" indent="-228600" algn="l" defTabSz="914400" rtl="0" eaLnBrk="1" latinLnBrk="0" hangingPunct="1">
+              <a:lnSpc>
+                <a:spcPct val="90000"/>
+              </a:lnSpc>
+              <a:spcBef>
+                <a:spcPts val="500"/>
+              </a:spcBef>
+              <a:buFont typeface="Arial" panose="020B0604020202020204" pitchFamily="34" charset="0"/>
+              <a:buChar char="•"/>
+              <a:defRPr sz="1800" kern="1200">
+                <a:solidFill>
+                  <a:schemeClr val="tx1"/>
+                </a:solidFill>
+                <a:latin typeface="+mn-lt"/>
+                <a:ea typeface="+mn-ea"/>
+                <a:cs typeface="+mn-cs"/>
+              </a:defRPr>
+            </a:lvl6pPr>
+            <a:lvl7pPr marL="2971800" indent="-228600" algn="l" defTabSz="914400" rtl="0" eaLnBrk="1" latinLnBrk="0" hangingPunct="1">
+              <a:lnSpc>
+                <a:spcPct val="90000"/>
+              </a:lnSpc>
+              <a:spcBef>
+                <a:spcPts val="500"/>
+              </a:spcBef>
+              <a:buFont typeface="Arial" panose="020B0604020202020204" pitchFamily="34" charset="0"/>
+              <a:buChar char="•"/>
+              <a:defRPr sz="1800" kern="1200">
+                <a:solidFill>
+                  <a:schemeClr val="tx1"/>
+                </a:solidFill>
+                <a:latin typeface="+mn-lt"/>
+                <a:ea typeface="+mn-ea"/>
+                <a:cs typeface="+mn-cs"/>
+              </a:defRPr>
+            </a:lvl7pPr>
+            <a:lvl8pPr marL="3429000" indent="-228600" algn="l" defTabSz="914400" rtl="0" eaLnBrk="1" latinLnBrk="0" hangingPunct="1">
+              <a:lnSpc>
+                <a:spcPct val="90000"/>
+              </a:lnSpc>
+              <a:spcBef>
+                <a:spcPts val="500"/>
+              </a:spcBef>
+              <a:buFont typeface="Arial" panose="020B0604020202020204" pitchFamily="34" charset="0"/>
+              <a:buChar char="•"/>
+              <a:defRPr sz="1800" kern="1200">
+                <a:solidFill>
+                  <a:schemeClr val="tx1"/>
+                </a:solidFill>
+                <a:latin typeface="+mn-lt"/>
+                <a:ea typeface="+mn-ea"/>
+                <a:cs typeface="+mn-cs"/>
+              </a:defRPr>
+            </a:lvl8pPr>
+            <a:lvl9pPr marL="3886200" indent="-228600" algn="l" defTabSz="914400" rtl="0" eaLnBrk="1" latinLnBrk="0" hangingPunct="1">
+              <a:lnSpc>
+                <a:spcPct val="90000"/>
+              </a:lnSpc>
+              <a:spcBef>
+                <a:spcPts val="500"/>
+              </a:spcBef>
+              <a:buFont typeface="Arial" panose="020B0604020202020204" pitchFamily="34" charset="0"/>
+              <a:buChar char="•"/>
+              <a:defRPr sz="1800" kern="1200">
+                <a:solidFill>
+                  <a:schemeClr val="tx1"/>
+                </a:solidFill>
+                <a:latin typeface="+mn-lt"/>
+                <a:ea typeface="+mn-ea"/>
+                <a:cs typeface="+mn-cs"/>
+              </a:defRPr>
+            </a:lvl9pPr>
+          </a:lstStyle>
+          <a:p>
+            <a:pPr>
+              <a:buFontTx/>
+              <a:buChar char="+"/>
+            </a:pPr>
+            <a:r>
+              <a:rPr lang="nl-NL" dirty="0" err="1" smtClean="0"/>
+              <a:t>Very</a:t>
+            </a:r>
+            <a:r>
+              <a:rPr lang="nl-NL" dirty="0" smtClean="0"/>
+              <a:t> well </a:t>
+            </a:r>
+            <a:r>
+              <a:rPr lang="nl-NL" dirty="0" err="1" smtClean="0"/>
+              <a:t>known</a:t>
+            </a:r>
+            <a:endParaRPr lang="nl-NL" dirty="0" smtClean="0"/>
+          </a:p>
+          <a:p>
+            <a:pPr>
+              <a:buFontTx/>
+              <a:buChar char="+"/>
+            </a:pPr>
+            <a:endParaRPr lang="nl-NL" dirty="0" smtClean="0"/>
+          </a:p>
+          <a:p>
+            <a:pPr>
+              <a:buFontTx/>
+              <a:buChar char="+"/>
+            </a:pPr>
+            <a:r>
+              <a:rPr lang="nl-NL" dirty="0" smtClean="0"/>
+              <a:t>Easy </a:t>
+            </a:r>
+            <a:r>
+              <a:rPr lang="nl-NL" dirty="0" err="1" smtClean="0"/>
+              <a:t>to</a:t>
+            </a:r>
+            <a:r>
+              <a:rPr lang="nl-NL" dirty="0" smtClean="0"/>
+              <a:t> </a:t>
+            </a:r>
+            <a:r>
+              <a:rPr lang="nl-NL" dirty="0" err="1" smtClean="0"/>
+              <a:t>use</a:t>
+            </a:r>
+            <a:r>
+              <a:rPr lang="nl-NL" dirty="0" smtClean="0"/>
+              <a:t> </a:t>
+            </a:r>
+            <a:r>
+              <a:rPr lang="nl-NL" dirty="0" err="1" smtClean="0"/>
+              <a:t>for</a:t>
+            </a:r>
+            <a:r>
+              <a:rPr lang="nl-NL" dirty="0" smtClean="0"/>
+              <a:t> </a:t>
+            </a:r>
+            <a:r>
+              <a:rPr lang="nl-NL" dirty="0" err="1" smtClean="0"/>
+              <a:t>anyone</a:t>
+            </a:r>
+            <a:endParaRPr lang="nl-NL" dirty="0" smtClean="0"/>
+          </a:p>
+          <a:p>
+            <a:pPr>
+              <a:buFontTx/>
+              <a:buChar char="+"/>
+            </a:pPr>
+            <a:endParaRPr lang="nl-NL" dirty="0" smtClean="0"/>
+          </a:p>
+          <a:p>
+            <a:pPr>
+              <a:buFontTx/>
+              <a:buChar char="+"/>
+            </a:pPr>
+            <a:endParaRPr lang="nl-NL" dirty="0" smtClean="0"/>
+          </a:p>
+          <a:p>
+            <a:pPr>
+              <a:buFontTx/>
+              <a:buChar char="+"/>
+            </a:pPr>
+            <a:endParaRPr lang="nl-BE" dirty="0"/>
           </a:p>
         </p:txBody>
       </p:sp>
@@ -15269,6 +16457,104 @@
                       </p:childTnLst>
                     </p:cTn>
                   </p:par>
+                  <p:par>
+                    <p:cTn id="19" fill="hold">
+                      <p:stCondLst>
+                        <p:cond delay="indefinite"/>
+                      </p:stCondLst>
+                      <p:childTnLst>
+                        <p:par>
+                          <p:cTn id="20" fill="hold">
+                            <p:stCondLst>
+                              <p:cond delay="0"/>
+                            </p:stCondLst>
+                            <p:childTnLst>
+                              <p:par>
+                                <p:cTn id="21" presetID="1" presetClass="entr" presetSubtype="0" fill="hold" grpId="0" nodeType="clickEffect">
+                                  <p:stCondLst>
+                                    <p:cond delay="0"/>
+                                  </p:stCondLst>
+                                  <p:childTnLst>
+                                    <p:set>
+                                      <p:cBhvr>
+                                        <p:cTn id="22" dur="1" fill="hold">
+                                          <p:stCondLst>
+                                            <p:cond delay="0"/>
+                                          </p:stCondLst>
+                                        </p:cTn>
+                                        <p:tgtEl>
+                                          <p:spTgt spid="7">
+                                            <p:txEl>
+                                              <p:pRg st="0" end="0"/>
+                                            </p:txEl>
+                                          </p:spTgt>
+                                        </p:tgtEl>
+                                        <p:attrNameLst>
+                                          <p:attrName>style.visibility</p:attrName>
+                                        </p:attrNameLst>
+                                      </p:cBhvr>
+                                      <p:to>
+                                        <p:strVal val="visible"/>
+                                      </p:to>
+                                    </p:set>
+                                  </p:childTnLst>
+                                </p:cTn>
+                              </p:par>
+                            </p:childTnLst>
+                          </p:cTn>
+                        </p:par>
+                      </p:childTnLst>
+                    </p:cTn>
+                  </p:par>
+                  <p:par>
+                    <p:cTn id="23" fill="hold">
+                      <p:stCondLst>
+                        <p:cond delay="indefinite"/>
+                      </p:stCondLst>
+                      <p:childTnLst>
+                        <p:par>
+                          <p:cTn id="24" fill="hold">
+                            <p:stCondLst>
+                              <p:cond delay="0"/>
+                            </p:stCondLst>
+                            <p:childTnLst>
+                              <p:par>
+                                <p:cTn id="25" presetID="1" presetClass="entr" presetSubtype="0" fill="hold" grpId="0" nodeType="clickEffect">
+                                  <p:stCondLst>
+                                    <p:cond delay="0"/>
+                                  </p:stCondLst>
+                                  <p:childTnLst>
+                                    <p:set>
+                                      <p:cBhvr>
+                                        <p:cTn id="26" dur="1" fill="hold">
+                                          <p:stCondLst>
+                                            <p:cond delay="0"/>
+                                          </p:stCondLst>
+                                        </p:cTn>
+                                        <p:tgtEl>
+                                          <p:spTgt spid="7">
+                                            <p:txEl>
+                                              <p:pRg st="2" end="2"/>
+                                            </p:txEl>
+                                          </p:spTgt>
+                                        </p:tgtEl>
+                                        <p:attrNameLst>
+                                          <p:attrName>style.visibility</p:attrName>
+                                        </p:attrNameLst>
+                                      </p:cBhvr>
+                                      <p:to>
+                                        <p:strVal val="visible"/>
+                                      </p:to>
+                                    </p:set>
+                                  </p:childTnLst>
+                                </p:cTn>
+                              </p:par>
+                            </p:childTnLst>
+                          </p:cTn>
+                        </p:par>
+                      </p:childTnLst>
+                    </p:cTn>
+                  </p:par>
                 </p:childTnLst>
               </p:cTn>
               <p:prevCondLst>
@@ -15292,6 +16578,7 @@
     </p:tnLst>
     <p:bldLst>
       <p:bldP spid="3" grpId="0" build="p"/>
+      <p:bldP spid="7" grpId="0" build="p"/>
     </p:bldLst>
   </p:timing>
 </p:sld>

</xml_diff>